<commit_message>
making some changes to the poster
</commit_message>
<xml_diff>
--- a/poster/poster.pptx
+++ b/poster/poster.pptx
@@ -106,7 +106,7 @@
   </p:defaultTextStyle>
   <p:extLst>
     <p:ext uri="{EFAFB233-063F-42B5-8137-9DF3F51BA10A}">
-      <p15:sldGuideLst xmlns:p15="http://schemas.microsoft.com/office/powerpoint/2012/main">
+      <p15:sldGuideLst xmlns:p15="http://schemas.microsoft.com/office/powerpoint/2012/main" xmlns="">
         <p15:guide id="1" orient="horz" pos="6912" userDrawn="1">
           <p15:clr>
             <a:srgbClr val="A4A3A4"/>
@@ -254,7 +254,7 @@
           <a:p>
             <a:fld id="{6B7A1737-7B87-42E8-863A-565794F87A24}" type="datetimeFigureOut">
               <a:rPr lang="en-CA" smtClean="0"/>
-              <a:t>5/19/16</a:t>
+              <a:t>2016-05-20</a:t>
             </a:fld>
             <a:endParaRPr lang="en-CA"/>
           </a:p>
@@ -424,7 +424,7 @@
           <a:p>
             <a:fld id="{6B7A1737-7B87-42E8-863A-565794F87A24}" type="datetimeFigureOut">
               <a:rPr lang="en-CA" smtClean="0"/>
-              <a:t>5/19/16</a:t>
+              <a:t>2016-05-20</a:t>
             </a:fld>
             <a:endParaRPr lang="en-CA"/>
           </a:p>
@@ -604,7 +604,7 @@
           <a:p>
             <a:fld id="{6B7A1737-7B87-42E8-863A-565794F87A24}" type="datetimeFigureOut">
               <a:rPr lang="en-CA" smtClean="0"/>
-              <a:t>5/19/16</a:t>
+              <a:t>2016-05-20</a:t>
             </a:fld>
             <a:endParaRPr lang="en-CA"/>
           </a:p>
@@ -774,7 +774,7 @@
           <a:p>
             <a:fld id="{6B7A1737-7B87-42E8-863A-565794F87A24}" type="datetimeFigureOut">
               <a:rPr lang="en-CA" smtClean="0"/>
-              <a:t>5/19/16</a:t>
+              <a:t>2016-05-20</a:t>
             </a:fld>
             <a:endParaRPr lang="en-CA"/>
           </a:p>
@@ -1018,7 +1018,7 @@
           <a:p>
             <a:fld id="{6B7A1737-7B87-42E8-863A-565794F87A24}" type="datetimeFigureOut">
               <a:rPr lang="en-CA" smtClean="0"/>
-              <a:t>5/19/16</a:t>
+              <a:t>2016-05-20</a:t>
             </a:fld>
             <a:endParaRPr lang="en-CA"/>
           </a:p>
@@ -1250,7 +1250,7 @@
           <a:p>
             <a:fld id="{6B7A1737-7B87-42E8-863A-565794F87A24}" type="datetimeFigureOut">
               <a:rPr lang="en-CA" smtClean="0"/>
-              <a:t>5/19/16</a:t>
+              <a:t>2016-05-20</a:t>
             </a:fld>
             <a:endParaRPr lang="en-CA"/>
           </a:p>
@@ -1617,7 +1617,7 @@
           <a:p>
             <a:fld id="{6B7A1737-7B87-42E8-863A-565794F87A24}" type="datetimeFigureOut">
               <a:rPr lang="en-CA" smtClean="0"/>
-              <a:t>5/19/16</a:t>
+              <a:t>2016-05-20</a:t>
             </a:fld>
             <a:endParaRPr lang="en-CA"/>
           </a:p>
@@ -1735,7 +1735,7 @@
           <a:p>
             <a:fld id="{6B7A1737-7B87-42E8-863A-565794F87A24}" type="datetimeFigureOut">
               <a:rPr lang="en-CA" smtClean="0"/>
-              <a:t>5/19/16</a:t>
+              <a:t>2016-05-20</a:t>
             </a:fld>
             <a:endParaRPr lang="en-CA"/>
           </a:p>
@@ -1830,7 +1830,7 @@
           <a:p>
             <a:fld id="{6B7A1737-7B87-42E8-863A-565794F87A24}" type="datetimeFigureOut">
               <a:rPr lang="en-CA" smtClean="0"/>
-              <a:t>5/19/16</a:t>
+              <a:t>2016-05-20</a:t>
             </a:fld>
             <a:endParaRPr lang="en-CA"/>
           </a:p>
@@ -2107,7 +2107,7 @@
           <a:p>
             <a:fld id="{6B7A1737-7B87-42E8-863A-565794F87A24}" type="datetimeFigureOut">
               <a:rPr lang="en-CA" smtClean="0"/>
-              <a:t>5/19/16</a:t>
+              <a:t>2016-05-20</a:t>
             </a:fld>
             <a:endParaRPr lang="en-CA"/>
           </a:p>
@@ -2364,7 +2364,7 @@
           <a:p>
             <a:fld id="{6B7A1737-7B87-42E8-863A-565794F87A24}" type="datetimeFigureOut">
               <a:rPr lang="en-CA" smtClean="0"/>
-              <a:t>5/19/16</a:t>
+              <a:t>2016-05-20</a:t>
             </a:fld>
             <a:endParaRPr lang="en-CA"/>
           </a:p>
@@ -2577,7 +2577,7 @@
           <a:p>
             <a:fld id="{6B7A1737-7B87-42E8-863A-565794F87A24}" type="datetimeFigureOut">
               <a:rPr lang="en-CA" smtClean="0"/>
-              <a:t>5/19/16</a:t>
+              <a:t>2016-05-20</a:t>
             </a:fld>
             <a:endParaRPr lang="en-CA"/>
           </a:p>
@@ -3227,7 +3227,7 @@
           <p:nvPr/>
         </p:nvPicPr>
         <p:blipFill>
-          <a:blip r:embed="rId2">
+          <a:blip r:embed="rId2" cstate="print">
             <a:extLst>
               <a:ext uri="{28A0092B-C50C-407E-A947-70E740481C1C}">
                 <a14:useLocalDpi xmlns:a14="http://schemas.microsoft.com/office/drawing/2010/main" val="0"/>
@@ -3744,7 +3744,15 @@
             </a:pPr>
             <a:r>
               <a:rPr lang="en-CA" sz="3600" dirty="0"/>
-              <a:t>We used social and classification data we to build a relationship graph for activities.</a:t>
+              <a:t>We used social and classification data </a:t>
+            </a:r>
+            <a:r>
+              <a:rPr lang="en-CA" sz="3600" dirty="0" smtClean="0"/>
+              <a:t>to </a:t>
+            </a:r>
+            <a:r>
+              <a:rPr lang="en-CA" sz="3600" dirty="0"/>
+              <a:t>build a relationship graph for activities.</a:t>
             </a:r>
           </a:p>
           <a:p>
@@ -3771,7 +3779,7 @@
           <p:nvPr/>
         </p:nvPicPr>
         <p:blipFill>
-          <a:blip r:embed="rId3">
+          <a:blip r:embed="rId3" cstate="print">
             <a:extLst>
               <a:ext uri="{BEBA8EAE-BF5A-486C-A8C5-ECC9F3942E4B}">
                 <a14:imgProps xmlns:a14="http://schemas.microsoft.com/office/drawing/2010/main">
@@ -3821,7 +3829,7 @@
           <p:nvPr/>
         </p:nvPicPr>
         <p:blipFill>
-          <a:blip r:embed="rId5">
+          <a:blip r:embed="rId5" cstate="print">
             <a:extLst>
               <a:ext uri="{28A0092B-C50C-407E-A947-70E740481C1C}">
                 <a14:useLocalDpi xmlns:a14="http://schemas.microsoft.com/office/drawing/2010/main" val="0"/>
@@ -3961,7 +3969,23 @@
                   <a:prstClr val="black"/>
                 </a:solidFill>
               </a:rPr>
-              <a:t>Fully connected graph with 100 activity nodes.</a:t>
+              <a:t>Fully connected graph with </a:t>
+            </a:r>
+            <a:r>
+              <a:rPr lang="en-CA" sz="3600" dirty="0" smtClean="0">
+                <a:solidFill>
+                  <a:prstClr val="black"/>
+                </a:solidFill>
+              </a:rPr>
+              <a:t>77 activity </a:t>
+            </a:r>
+            <a:r>
+              <a:rPr lang="en-CA" sz="3600" dirty="0">
+                <a:solidFill>
+                  <a:prstClr val="black"/>
+                </a:solidFill>
+              </a:rPr>
+              <a:t>nodes.</a:t>
             </a:r>
             <a:endParaRPr lang="en-CA" sz="3600" b="0" i="1" dirty="0">
               <a:latin typeface="Cambria Math" panose="02040503050406030204" pitchFamily="18" charset="0"/>
@@ -4668,7 +4692,23 @@
                   <a:prstClr val="black"/>
                 </a:solidFill>
               </a:rPr>
-              <a:t>User provides 5 input activities.</a:t>
+              <a:t>User </a:t>
+            </a:r>
+            <a:r>
+              <a:rPr lang="en-CA" sz="3600" dirty="0" smtClean="0">
+                <a:solidFill>
+                  <a:prstClr val="black"/>
+                </a:solidFill>
+              </a:rPr>
+              <a:t>provides up to </a:t>
+            </a:r>
+            <a:r>
+              <a:rPr lang="en-CA" sz="3600" dirty="0">
+                <a:solidFill>
+                  <a:prstClr val="black"/>
+                </a:solidFill>
+              </a:rPr>
+              <a:t>5 input activities.</a:t>
             </a:r>
             <a:endParaRPr lang="en-CA" sz="3600" i="1" dirty="0"/>
           </a:p>
@@ -4700,7 +4740,7 @@
           <p:nvPr>
             <p:extLst>
               <p:ext uri="{D42A27DB-BD31-4B8C-83A1-F6EECF244321}">
-                <p14:modId xmlns:p14="http://schemas.microsoft.com/office/powerpoint/2010/main" val="4213945462"/>
+                <p14:modId xmlns:p14="http://schemas.microsoft.com/office/powerpoint/2010/main" val="438742233"/>
               </p:ext>
             </p:extLst>
           </p:nvPr>
@@ -4719,28 +4759,28 @@
                 <a:gridCol w="2453135">
                   <a:extLst>
                     <a:ext uri="{9D8B030D-6E8A-4147-A177-3AD203B41FA5}">
-                      <a16:colId xmlns:a16="http://schemas.microsoft.com/office/drawing/2014/main" val="3234236087"/>
+                      <a16:colId xmlns:a16="http://schemas.microsoft.com/office/drawing/2014/main" xmlns="" val="3234236087"/>
                     </a:ext>
                   </a:extLst>
                 </a:gridCol>
                 <a:gridCol w="2453135">
                   <a:extLst>
                     <a:ext uri="{9D8B030D-6E8A-4147-A177-3AD203B41FA5}">
-                      <a16:colId xmlns:a16="http://schemas.microsoft.com/office/drawing/2014/main" val="2361038209"/>
+                      <a16:colId xmlns:a16="http://schemas.microsoft.com/office/drawing/2014/main" xmlns="" val="2361038209"/>
                     </a:ext>
                   </a:extLst>
                 </a:gridCol>
                 <a:gridCol w="2453135">
                   <a:extLst>
                     <a:ext uri="{9D8B030D-6E8A-4147-A177-3AD203B41FA5}">
-                      <a16:colId xmlns:a16="http://schemas.microsoft.com/office/drawing/2014/main" val="600948068"/>
+                      <a16:colId xmlns:a16="http://schemas.microsoft.com/office/drawing/2014/main" xmlns="" val="600948068"/>
                     </a:ext>
                   </a:extLst>
                 </a:gridCol>
                 <a:gridCol w="2453135">
                   <a:extLst>
                     <a:ext uri="{9D8B030D-6E8A-4147-A177-3AD203B41FA5}">
-                      <a16:colId xmlns:a16="http://schemas.microsoft.com/office/drawing/2014/main" val="3971599481"/>
+                      <a16:colId xmlns:a16="http://schemas.microsoft.com/office/drawing/2014/main" xmlns="" val="3971599481"/>
                     </a:ext>
                   </a:extLst>
                 </a:gridCol>
@@ -4813,7 +4853,7 @@
                 </a:tc>
                 <a:extLst>
                   <a:ext uri="{0D108BD9-81ED-4DB2-BD59-A6C34878D82A}">
-                    <a16:rowId xmlns:a16="http://schemas.microsoft.com/office/drawing/2014/main" val="1488854628"/>
+                    <a16:rowId xmlns:a16="http://schemas.microsoft.com/office/drawing/2014/main" xmlns="" val="1488854628"/>
                   </a:ext>
                 </a:extLst>
               </a:tr>
@@ -4916,7 +4956,7 @@
                 </a:tc>
                 <a:extLst>
                   <a:ext uri="{0D108BD9-81ED-4DB2-BD59-A6C34878D82A}">
-                    <a16:rowId xmlns:a16="http://schemas.microsoft.com/office/drawing/2014/main" val="2730295962"/>
+                    <a16:rowId xmlns:a16="http://schemas.microsoft.com/office/drawing/2014/main" xmlns="" val="2730295962"/>
                   </a:ext>
                 </a:extLst>
               </a:tr>
@@ -4976,9 +5016,10 @@
                     <a:p>
                       <a:pPr algn="ctr"/>
                       <a:r>
-                        <a:rPr lang="en-CA" sz="2400" dirty="0"/>
-                        <a:t>0.534</a:t>
+                        <a:rPr lang="en-CA" sz="2400" dirty="0" smtClean="0"/>
+                        <a:t>0.125</a:t>
                       </a:r>
+                      <a:endParaRPr lang="en-CA" sz="2400" dirty="0"/>
                     </a:p>
                   </a:txBody>
                   <a:tcPr marL="53521" marR="53521" marT="26760" marB="26760">
@@ -4999,6 +5040,10 @@
                     <a:lstStyle/>
                     <a:p>
                       <a:pPr algn="ctr"/>
+                      <a:r>
+                        <a:rPr lang="en-CA" sz="2400" dirty="0" smtClean="0"/>
+                        <a:t>0.071</a:t>
+                      </a:r>
                       <a:endParaRPr lang="en-CA" sz="2400" dirty="0"/>
                     </a:p>
                   </a:txBody>
@@ -5016,7 +5061,7 @@
                 </a:tc>
                 <a:extLst>
                   <a:ext uri="{0D108BD9-81ED-4DB2-BD59-A6C34878D82A}">
-                    <a16:rowId xmlns:a16="http://schemas.microsoft.com/office/drawing/2014/main" val="944698896"/>
+                    <a16:rowId xmlns:a16="http://schemas.microsoft.com/office/drawing/2014/main" xmlns="" val="944698896"/>
                   </a:ext>
                 </a:extLst>
               </a:tr>
@@ -5056,9 +5101,10 @@
                     <a:p>
                       <a:pPr algn="ctr"/>
                       <a:r>
-                        <a:rPr lang="en-CA" sz="2400" dirty="0"/>
-                        <a:t>0.278</a:t>
+                        <a:rPr lang="en-CA" sz="2400" dirty="0" smtClean="0"/>
+                        <a:t>0.072</a:t>
                       </a:r>
+                      <a:endParaRPr lang="en-CA" sz="2400" dirty="0"/>
                     </a:p>
                   </a:txBody>
                   <a:tcPr marL="53521" marR="53521" marT="26760" marB="26760"/>
@@ -5069,6 +5115,10 @@
                     <a:lstStyle/>
                     <a:p>
                       <a:pPr algn="ctr"/>
+                      <a:r>
+                        <a:rPr lang="en-CA" sz="2400" dirty="0" smtClean="0"/>
+                        <a:t>0.037</a:t>
+                      </a:r>
                       <a:endParaRPr lang="en-CA" sz="2400" dirty="0"/>
                     </a:p>
                   </a:txBody>
@@ -5076,7 +5126,7 @@
                 </a:tc>
                 <a:extLst>
                   <a:ext uri="{0D108BD9-81ED-4DB2-BD59-A6C34878D82A}">
-                    <a16:rowId xmlns:a16="http://schemas.microsoft.com/office/drawing/2014/main" val="542318825"/>
+                    <a16:rowId xmlns:a16="http://schemas.microsoft.com/office/drawing/2014/main" xmlns="" val="542318825"/>
                   </a:ext>
                 </a:extLst>
               </a:tr>
@@ -5116,9 +5166,10 @@
                     <a:p>
                       <a:pPr algn="ctr"/>
                       <a:r>
-                        <a:rPr lang="en-CA" sz="2400" dirty="0"/>
-                        <a:t>0.168</a:t>
+                        <a:rPr lang="en-CA" sz="2400" dirty="0" smtClean="0"/>
+                        <a:t>0.043</a:t>
                       </a:r>
+                      <a:endParaRPr lang="en-CA" sz="2400" dirty="0"/>
                     </a:p>
                   </a:txBody>
                   <a:tcPr marL="53521" marR="53521" marT="26760" marB="26760"/>
@@ -5129,6 +5180,10 @@
                     <a:lstStyle/>
                     <a:p>
                       <a:pPr algn="ctr"/>
+                      <a:r>
+                        <a:rPr lang="en-CA" sz="2400" dirty="0" smtClean="0"/>
+                        <a:t>0.030</a:t>
+                      </a:r>
                       <a:endParaRPr lang="en-CA" sz="2400" dirty="0"/>
                     </a:p>
                   </a:txBody>
@@ -5136,7 +5191,7 @@
                 </a:tc>
                 <a:extLst>
                   <a:ext uri="{0D108BD9-81ED-4DB2-BD59-A6C34878D82A}">
-                    <a16:rowId xmlns:a16="http://schemas.microsoft.com/office/drawing/2014/main" val="2736929169"/>
+                    <a16:rowId xmlns:a16="http://schemas.microsoft.com/office/drawing/2014/main" xmlns="" val="2736929169"/>
                   </a:ext>
                 </a:extLst>
               </a:tr>
@@ -5155,7 +5210,7 @@
             <p:spPr>
               <a:xfrm>
                 <a:off x="8861239" y="13493758"/>
-                <a:ext cx="8135880" cy="3917098"/>
+                <a:ext cx="8135880" cy="4008533"/>
               </a:xfrm>
               <a:prstGeom prst="rect">
                 <a:avLst/>
@@ -5181,17 +5236,17 @@
                       <m:sSub>
                         <m:sSubPr>
                           <m:ctrlPr>
-                            <a:rPr lang="en-CA" sz="3600" i="1">
+                            <a:rPr lang="en-CA" sz="2800" i="1" smtClean="0">
                               <a:solidFill>
                                 <a:prstClr val="black"/>
                               </a:solidFill>
-                              <a:latin typeface="Cambria Math" panose="02040503050406030204" pitchFamily="18" charset="0"/>
+                              <a:latin typeface="Cambria Math"/>
                             </a:rPr>
                           </m:ctrlPr>
                         </m:sSubPr>
                         <m:e>
                           <m:r>
-                            <a:rPr lang="en-CA" sz="3600" i="1">
+                            <a:rPr lang="en-CA" sz="2800" i="1">
                               <a:solidFill>
                                 <a:prstClr val="black"/>
                               </a:solidFill>
@@ -5202,7 +5257,7 @@
                         </m:e>
                         <m:sub>
                           <m:r>
-                            <a:rPr lang="en-CA" sz="3600" i="1">
+                            <a:rPr lang="en-CA" sz="2800" i="1">
                               <a:solidFill>
                                 <a:prstClr val="black"/>
                               </a:solidFill>
@@ -5215,11 +5270,11 @@
                       <m:d>
                         <m:dPr>
                           <m:ctrlPr>
-                            <a:rPr lang="en-CA" sz="3600" i="1">
+                            <a:rPr lang="en-CA" sz="2800" i="1">
                               <a:solidFill>
                                 <a:prstClr val="black"/>
                               </a:solidFill>
-                              <a:latin typeface="Cambria Math" panose="02040503050406030204" pitchFamily="18" charset="0"/>
+                              <a:latin typeface="Cambria Math"/>
                             </a:rPr>
                           </m:ctrlPr>
                         </m:dPr>
@@ -5227,17 +5282,17 @@
                           <m:sSub>
                             <m:sSubPr>
                               <m:ctrlPr>
-                                <a:rPr lang="en-CA" sz="3600" i="1">
+                                <a:rPr lang="en-CA" sz="2800" i="1">
                                   <a:solidFill>
                                     <a:prstClr val="black"/>
                                   </a:solidFill>
-                                  <a:latin typeface="Cambria Math" panose="02040503050406030204" pitchFamily="18" charset="0"/>
+                                  <a:latin typeface="Cambria Math"/>
                                 </a:rPr>
                               </m:ctrlPr>
                             </m:sSubPr>
                             <m:e>
                               <m:r>
-                                <a:rPr lang="en-CA" sz="3600" i="1">
+                                <a:rPr lang="en-CA" sz="2800" i="1">
                                   <a:solidFill>
                                     <a:prstClr val="black"/>
                                   </a:solidFill>
@@ -5248,7 +5303,7 @@
                             </m:e>
                             <m:sub>
                               <m:r>
-                                <a:rPr lang="en-CA" sz="3600" i="1">
+                                <a:rPr lang="en-CA" sz="2800" i="1">
                                   <a:solidFill>
                                     <a:prstClr val="black"/>
                                   </a:solidFill>
@@ -5259,7 +5314,7 @@
                             </m:sub>
                           </m:sSub>
                           <m:r>
-                            <a:rPr lang="en-CA" sz="3600" i="1">
+                            <a:rPr lang="en-CA" sz="2800" i="1">
                               <a:solidFill>
                                 <a:prstClr val="black"/>
                               </a:solidFill>
@@ -5270,17 +5325,17 @@
                           <m:sSub>
                             <m:sSubPr>
                               <m:ctrlPr>
-                                <a:rPr lang="en-CA" sz="3600" i="1">
+                                <a:rPr lang="en-CA" sz="2800" i="1">
                                   <a:solidFill>
                                     <a:prstClr val="black"/>
                                   </a:solidFill>
-                                  <a:latin typeface="Cambria Math" panose="02040503050406030204" pitchFamily="18" charset="0"/>
+                                  <a:latin typeface="Cambria Math"/>
                                 </a:rPr>
                               </m:ctrlPr>
                             </m:sSubPr>
                             <m:e>
                               <m:r>
-                                <a:rPr lang="en-CA" sz="3600" i="1">
+                                <a:rPr lang="en-CA" sz="2800" i="1">
                                   <a:solidFill>
                                     <a:prstClr val="black"/>
                                   </a:solidFill>
@@ -5291,7 +5346,7 @@
                             </m:e>
                             <m:sub>
                               <m:r>
-                                <a:rPr lang="en-CA" sz="3600" i="1">
+                                <a:rPr lang="en-CA" sz="2800" i="1">
                                   <a:solidFill>
                                     <a:prstClr val="black"/>
                                   </a:solidFill>
@@ -5304,7 +5359,7 @@
                         </m:e>
                       </m:d>
                       <m:r>
-                        <a:rPr lang="en-CA" sz="3600" i="1">
+                        <a:rPr lang="en-CA" sz="2800" i="1">
                           <a:solidFill>
                             <a:prstClr val="black"/>
                           </a:solidFill>
@@ -5315,11 +5370,11 @@
                       <m:f>
                         <m:fPr>
                           <m:ctrlPr>
-                            <a:rPr lang="en-CA" sz="3600" i="1">
+                            <a:rPr lang="en-CA" sz="2800" i="1">
                               <a:solidFill>
                                 <a:prstClr val="black"/>
                               </a:solidFill>
-                              <a:latin typeface="Cambria Math" panose="02040503050406030204" pitchFamily="18" charset="0"/>
+                              <a:latin typeface="Cambria Math"/>
                               <a:ea typeface="Cambria Math" panose="02040503050406030204" pitchFamily="18" charset="0"/>
                             </a:rPr>
                           </m:ctrlPr>
@@ -5330,11 +5385,11 @@
                               <m:chr m:val="∑"/>
                               <m:supHide m:val="on"/>
                               <m:ctrlPr>
-                                <a:rPr lang="en-CA" sz="3600" i="1">
+                                <a:rPr lang="en-CA" sz="2800" i="1">
                                   <a:solidFill>
                                     <a:prstClr val="black"/>
                                   </a:solidFill>
-                                  <a:latin typeface="Cambria Math" panose="02040503050406030204" pitchFamily="18" charset="0"/>
+                                  <a:latin typeface="Cambria Math"/>
                                   <a:ea typeface="Cambria Math" panose="02040503050406030204" pitchFamily="18" charset="0"/>
                                 </a:rPr>
                               </m:ctrlPr>
@@ -5343,18 +5398,18 @@
                               <m:sSub>
                                 <m:sSubPr>
                                   <m:ctrlPr>
-                                    <a:rPr lang="en-CA" sz="3600" i="1">
+                                    <a:rPr lang="en-CA" sz="2800" i="1">
                                       <a:solidFill>
                                         <a:prstClr val="black"/>
                                       </a:solidFill>
-                                      <a:latin typeface="Cambria Math" panose="02040503050406030204" pitchFamily="18" charset="0"/>
+                                      <a:latin typeface="Cambria Math"/>
                                       <a:ea typeface="Cambria Math" panose="02040503050406030204" pitchFamily="18" charset="0"/>
                                     </a:rPr>
                                   </m:ctrlPr>
                                 </m:sSubPr>
                                 <m:e>
                                   <m:r>
-                                    <a:rPr lang="en-CA" sz="3600" i="1">
+                                    <a:rPr lang="en-CA" sz="2800" i="1">
                                       <a:solidFill>
                                         <a:prstClr val="black"/>
                                       </a:solidFill>
@@ -5366,7 +5421,7 @@
                                 </m:e>
                                 <m:sub>
                                   <m:r>
-                                    <a:rPr lang="en-CA" sz="3600" i="1">
+                                    <a:rPr lang="en-CA" sz="2800" i="1">
                                       <a:solidFill>
                                         <a:prstClr val="black"/>
                                       </a:solidFill>
@@ -5383,18 +5438,18 @@
                               <m:sSub>
                                 <m:sSubPr>
                                   <m:ctrlPr>
-                                    <a:rPr lang="en-CA" sz="3600" i="1">
+                                    <a:rPr lang="en-CA" sz="2800" i="1">
                                       <a:solidFill>
                                         <a:prstClr val="black"/>
                                       </a:solidFill>
-                                      <a:latin typeface="Cambria Math" panose="02040503050406030204" pitchFamily="18" charset="0"/>
+                                      <a:latin typeface="Cambria Math"/>
                                       <a:ea typeface="Cambria Math" panose="02040503050406030204" pitchFamily="18" charset="0"/>
                                     </a:rPr>
                                   </m:ctrlPr>
                                 </m:sSubPr>
                                 <m:e>
                                   <m:r>
-                                    <a:rPr lang="en-CA" sz="3600" i="1">
+                                    <a:rPr lang="en-CA" sz="2800" i="1">
                                       <a:solidFill>
                                         <a:prstClr val="black"/>
                                       </a:solidFill>
@@ -5410,11 +5465,11 @@
                                       <m:begChr m:val="{"/>
                                       <m:endChr m:val="}"/>
                                       <m:ctrlPr>
-                                        <a:rPr lang="en-CA" sz="3600" i="1">
+                                        <a:rPr lang="en-CA" sz="2800" i="1">
                                           <a:solidFill>
                                             <a:prstClr val="black"/>
                                           </a:solidFill>
-                                          <a:latin typeface="Cambria Math" panose="02040503050406030204" pitchFamily="18" charset="0"/>
+                                          <a:latin typeface="Cambria Math"/>
                                           <a:ea typeface="Cambria Math" panose="02040503050406030204" pitchFamily="18" charset="0"/>
                                         </a:rPr>
                                       </m:ctrlPr>
@@ -5423,18 +5478,18 @@
                                       <m:sSub>
                                         <m:sSubPr>
                                           <m:ctrlPr>
-                                            <a:rPr lang="en-CA" sz="3600" i="1">
+                                            <a:rPr lang="en-CA" sz="2800" i="1">
                                               <a:solidFill>
                                                 <a:prstClr val="black"/>
                                               </a:solidFill>
-                                              <a:latin typeface="Cambria Math" panose="02040503050406030204" pitchFamily="18" charset="0"/>
+                                              <a:latin typeface="Cambria Math"/>
                                               <a:ea typeface="Cambria Math" panose="02040503050406030204" pitchFamily="18" charset="0"/>
                                             </a:rPr>
                                           </m:ctrlPr>
                                         </m:sSubPr>
                                         <m:e>
                                           <m:r>
-                                            <a:rPr lang="en-CA" sz="3600" i="1">
+                                            <a:rPr lang="en-CA" sz="2800" i="1">
                                               <a:solidFill>
                                                 <a:prstClr val="black"/>
                                               </a:solidFill>
@@ -5446,7 +5501,7 @@
                                         </m:e>
                                         <m:sub>
                                           <m:r>
-                                            <a:rPr lang="en-CA" sz="3600" i="1">
+                                            <a:rPr lang="en-CA" sz="2800" i="1">
                                               <a:solidFill>
                                                 <a:prstClr val="black"/>
                                               </a:solidFill>
@@ -5458,7 +5513,7 @@
                                         </m:sub>
                                       </m:sSub>
                                       <m:r>
-                                        <a:rPr lang="en-CA" sz="3600" i="1">
+                                        <a:rPr lang="en-CA" sz="2800" i="1">
                                           <a:solidFill>
                                             <a:prstClr val="black"/>
                                           </a:solidFill>
@@ -5470,18 +5525,18 @@
                                       <m:sSub>
                                         <m:sSubPr>
                                           <m:ctrlPr>
-                                            <a:rPr lang="en-CA" sz="3600" i="1">
+                                            <a:rPr lang="en-CA" sz="2800" i="1">
                                               <a:solidFill>
                                                 <a:prstClr val="black"/>
                                               </a:solidFill>
-                                              <a:latin typeface="Cambria Math" panose="02040503050406030204" pitchFamily="18" charset="0"/>
+                                              <a:latin typeface="Cambria Math"/>
                                               <a:ea typeface="Cambria Math" panose="02040503050406030204" pitchFamily="18" charset="0"/>
                                             </a:rPr>
                                           </m:ctrlPr>
                                         </m:sSubPr>
                                         <m:e>
                                           <m:r>
-                                            <a:rPr lang="en-CA" sz="3600" i="1">
+                                            <a:rPr lang="en-CA" sz="2800" i="1">
                                               <a:solidFill>
                                                 <a:prstClr val="black"/>
                                               </a:solidFill>
@@ -5493,7 +5548,7 @@
                                         </m:e>
                                         <m:sub>
                                           <m:r>
-                                            <a:rPr lang="en-CA" sz="3600" i="1">
+                                            <a:rPr lang="en-CA" sz="2800" i="1">
                                               <a:solidFill>
                                                 <a:prstClr val="black"/>
                                               </a:solidFill>
@@ -5517,11 +5572,11 @@
                               <m:chr m:val="∑"/>
                               <m:supHide m:val="on"/>
                               <m:ctrlPr>
-                                <a:rPr lang="en-CA" sz="3600" i="1">
+                                <a:rPr lang="en-CA" sz="2800" i="1">
                                   <a:solidFill>
                                     <a:prstClr val="black"/>
                                   </a:solidFill>
-                                  <a:latin typeface="Cambria Math" panose="02040503050406030204" pitchFamily="18" charset="0"/>
+                                  <a:latin typeface="Cambria Math"/>
                                   <a:ea typeface="Cambria Math" panose="02040503050406030204" pitchFamily="18" charset="0"/>
                                 </a:rPr>
                               </m:ctrlPr>
@@ -5531,7 +5586,7 @@
                                 <m:rPr>
                                   <m:brk m:alnAt="7"/>
                                 </m:rPr>
-                                <a:rPr lang="en-CA" sz="3600" i="1">
+                                <a:rPr lang="en-CA" sz="2800" i="1">
                                   <a:solidFill>
                                     <a:prstClr val="black"/>
                                   </a:solidFill>
@@ -5548,11 +5603,11 @@
                                   <m:chr m:val="∑"/>
                                   <m:supHide m:val="on"/>
                                   <m:ctrlPr>
-                                    <a:rPr lang="en-CA" sz="3600" i="1">
+                                    <a:rPr lang="en-CA" sz="2800" i="1">
                                       <a:solidFill>
                                         <a:prstClr val="black"/>
                                       </a:solidFill>
-                                      <a:latin typeface="Cambria Math" panose="02040503050406030204" pitchFamily="18" charset="0"/>
+                                      <a:latin typeface="Cambria Math"/>
                                       <a:ea typeface="Cambria Math" panose="02040503050406030204" pitchFamily="18" charset="0"/>
                                     </a:rPr>
                                   </m:ctrlPr>
@@ -5561,18 +5616,18 @@
                                   <m:sSub>
                                     <m:sSubPr>
                                       <m:ctrlPr>
-                                        <a:rPr lang="en-CA" sz="3600" i="1">
+                                        <a:rPr lang="en-CA" sz="2800" i="1">
                                           <a:solidFill>
                                             <a:prstClr val="black"/>
                                           </a:solidFill>
-                                          <a:latin typeface="Cambria Math" panose="02040503050406030204" pitchFamily="18" charset="0"/>
+                                          <a:latin typeface="Cambria Math"/>
                                           <a:ea typeface="Cambria Math" panose="02040503050406030204" pitchFamily="18" charset="0"/>
                                         </a:rPr>
                                       </m:ctrlPr>
                                     </m:sSubPr>
                                     <m:e>
                                       <m:r>
-                                        <a:rPr lang="en-CA" sz="3600" i="1">
+                                        <a:rPr lang="en-CA" sz="2800" i="1">
                                           <a:solidFill>
                                             <a:prstClr val="black"/>
                                           </a:solidFill>
@@ -5584,7 +5639,7 @@
                                     </m:e>
                                     <m:sub>
                                       <m:r>
-                                        <a:rPr lang="en-CA" sz="3600" i="1">
+                                        <a:rPr lang="en-CA" sz="2800" i="1">
                                           <a:solidFill>
                                             <a:prstClr val="black"/>
                                           </a:solidFill>
@@ -5601,18 +5656,18 @@
                                   <m:sSub>
                                     <m:sSubPr>
                                       <m:ctrlPr>
-                                        <a:rPr lang="en-CA" sz="3600" i="1">
+                                        <a:rPr lang="en-CA" sz="2800" i="1">
                                           <a:solidFill>
                                             <a:prstClr val="black"/>
                                           </a:solidFill>
-                                          <a:latin typeface="Cambria Math" panose="02040503050406030204" pitchFamily="18" charset="0"/>
+                                          <a:latin typeface="Cambria Math"/>
                                           <a:ea typeface="Cambria Math" panose="02040503050406030204" pitchFamily="18" charset="0"/>
                                         </a:rPr>
                                       </m:ctrlPr>
                                     </m:sSubPr>
                                     <m:e>
                                       <m:r>
-                                        <a:rPr lang="en-CA" sz="3600" i="1">
+                                        <a:rPr lang="en-CA" sz="2800" i="1">
                                           <a:solidFill>
                                             <a:prstClr val="black"/>
                                           </a:solidFill>
@@ -5628,11 +5683,11 @@
                                           <m:begChr m:val="{"/>
                                           <m:endChr m:val="}"/>
                                           <m:ctrlPr>
-                                            <a:rPr lang="en-CA" sz="3600" i="1">
+                                            <a:rPr lang="en-CA" sz="2800" i="1">
                                               <a:solidFill>
                                                 <a:prstClr val="black"/>
                                               </a:solidFill>
-                                              <a:latin typeface="Cambria Math" panose="02040503050406030204" pitchFamily="18" charset="0"/>
+                                              <a:latin typeface="Cambria Math"/>
                                               <a:ea typeface="Cambria Math" panose="02040503050406030204" pitchFamily="18" charset="0"/>
                                             </a:rPr>
                                           </m:ctrlPr>
@@ -5641,18 +5696,18 @@
                                           <m:sSub>
                                             <m:sSubPr>
                                               <m:ctrlPr>
-                                                <a:rPr lang="en-CA" sz="3600" i="1">
+                                                <a:rPr lang="en-CA" sz="2800" i="1">
                                                   <a:solidFill>
                                                     <a:prstClr val="black"/>
                                                   </a:solidFill>
-                                                  <a:latin typeface="Cambria Math" panose="02040503050406030204" pitchFamily="18" charset="0"/>
+                                                  <a:latin typeface="Cambria Math"/>
                                                   <a:ea typeface="Cambria Math" panose="02040503050406030204" pitchFamily="18" charset="0"/>
                                                 </a:rPr>
                                               </m:ctrlPr>
                                             </m:sSubPr>
                                             <m:e>
                                               <m:r>
-                                                <a:rPr lang="en-CA" sz="3600" i="1">
+                                                <a:rPr lang="en-CA" sz="2800" i="1">
                                                   <a:solidFill>
                                                     <a:prstClr val="black"/>
                                                   </a:solidFill>
@@ -5664,7 +5719,7 @@
                                             </m:e>
                                             <m:sub>
                                               <m:r>
-                                                <a:rPr lang="en-CA" sz="3600" i="1">
+                                                <a:rPr lang="en-CA" sz="2800" i="1">
                                                   <a:solidFill>
                                                     <a:prstClr val="black"/>
                                                   </a:solidFill>
@@ -5676,7 +5731,7 @@
                                             </m:sub>
                                           </m:sSub>
                                           <m:r>
-                                            <a:rPr lang="en-CA" sz="3600" i="1">
+                                            <a:rPr lang="en-CA" sz="2800" i="1">
                                               <a:solidFill>
                                                 <a:prstClr val="black"/>
                                               </a:solidFill>
@@ -5688,18 +5743,18 @@
                                           <m:sSub>
                                             <m:sSubPr>
                                               <m:ctrlPr>
-                                                <a:rPr lang="en-CA" sz="3600" i="1">
+                                                <a:rPr lang="en-CA" sz="2800" i="1">
                                                   <a:solidFill>
                                                     <a:prstClr val="black"/>
                                                   </a:solidFill>
-                                                  <a:latin typeface="Cambria Math" panose="02040503050406030204" pitchFamily="18" charset="0"/>
+                                                  <a:latin typeface="Cambria Math"/>
                                                   <a:ea typeface="Cambria Math" panose="02040503050406030204" pitchFamily="18" charset="0"/>
                                                 </a:rPr>
                                               </m:ctrlPr>
                                             </m:sSubPr>
                                             <m:e>
                                               <m:r>
-                                                <a:rPr lang="en-CA" sz="3600" i="1">
+                                                <a:rPr lang="en-CA" sz="2800" i="1">
                                                   <a:solidFill>
                                                     <a:prstClr val="black"/>
                                                   </a:solidFill>
@@ -5711,7 +5766,7 @@
                                             </m:e>
                                             <m:sub>
                                               <m:r>
-                                                <a:rPr lang="en-CA" sz="3600" i="1">
+                                                <a:rPr lang="en-CA" sz="2800" i="1">
                                                   <a:solidFill>
                                                     <a:prstClr val="black"/>
                                                   </a:solidFill>
@@ -5735,7 +5790,7 @@
                     </m:oMath>
                   </m:oMathPara>
                 </a14:m>
-                <a:endParaRPr lang="en-CA" sz="3600" dirty="0">
+                <a:endParaRPr lang="en-CA" sz="2800" dirty="0">
                   <a:solidFill>
                     <a:prstClr val="black"/>
                   </a:solidFill>
@@ -5747,7 +5802,521 @@
                     <a:srgbClr val="FF6A19"/>
                   </a:buClr>
                 </a:pPr>
-                <a:endParaRPr lang="en-CA" sz="3600" dirty="0">
+                <a:endParaRPr lang="en-CA" sz="2800" dirty="0">
+                  <a:solidFill>
+                    <a:prstClr val="black"/>
+                  </a:solidFill>
+                </a:endParaRPr>
+              </a:p>
+              <a:p>
+                <a:pPr lvl="0">
+                  <a:lnSpc>
+                    <a:spcPct val="150000"/>
+                  </a:lnSpc>
+                  <a:buClr>
+                    <a:srgbClr val="FF6A19"/>
+                  </a:buClr>
+                </a:pPr>
+                <a14:m>
+                  <m:oMath xmlns:m="http://schemas.openxmlformats.org/officeDocument/2006/math">
+                    <m:sSub>
+                      <m:sSubPr>
+                        <m:ctrlPr>
+                          <a:rPr lang="en-CA" sz="2800" i="1">
+                            <a:solidFill>
+                              <a:prstClr val="black"/>
+                            </a:solidFill>
+                            <a:latin typeface="Cambria Math"/>
+                          </a:rPr>
+                        </m:ctrlPr>
+                      </m:sSubPr>
+                      <m:e>
+                        <m:r>
+                          <a:rPr lang="en-CA" sz="2800" i="1">
+                            <a:solidFill>
+                              <a:prstClr val="black"/>
+                            </a:solidFill>
+                            <a:latin typeface="Cambria Math" panose="02040503050406030204" pitchFamily="18" charset="0"/>
+                          </a:rPr>
+                          <m:t>𝑤</m:t>
+                        </m:r>
+                      </m:e>
+                      <m:sub>
+                        <m:r>
+                          <a:rPr lang="en-CA" sz="2800" i="1">
+                            <a:solidFill>
+                              <a:prstClr val="black"/>
+                            </a:solidFill>
+                            <a:latin typeface="Cambria Math" panose="02040503050406030204" pitchFamily="18" charset="0"/>
+                          </a:rPr>
+                          <m:t>𝑊𝑖𝑘𝑖</m:t>
+                        </m:r>
+                      </m:sub>
+                    </m:sSub>
+                    <m:d>
+                      <m:dPr>
+                        <m:ctrlPr>
+                          <a:rPr lang="en-CA" sz="2800" i="1">
+                            <a:solidFill>
+                              <a:prstClr val="black"/>
+                            </a:solidFill>
+                            <a:latin typeface="Cambria Math"/>
+                          </a:rPr>
+                        </m:ctrlPr>
+                      </m:dPr>
+                      <m:e>
+                        <m:sSub>
+                          <m:sSubPr>
+                            <m:ctrlPr>
+                              <a:rPr lang="en-CA" sz="2800" i="1">
+                                <a:solidFill>
+                                  <a:prstClr val="black"/>
+                                </a:solidFill>
+                                <a:latin typeface="Cambria Math"/>
+                              </a:rPr>
+                            </m:ctrlPr>
+                          </m:sSubPr>
+                          <m:e>
+                            <m:r>
+                              <a:rPr lang="en-CA" sz="2800" i="1">
+                                <a:solidFill>
+                                  <a:prstClr val="black"/>
+                                </a:solidFill>
+                                <a:latin typeface="Cambria Math" panose="02040503050406030204" pitchFamily="18" charset="0"/>
+                              </a:rPr>
+                              <m:t>𝑎</m:t>
+                            </m:r>
+                          </m:e>
+                          <m:sub>
+                            <m:r>
+                              <a:rPr lang="en-CA" sz="2800" i="1">
+                                <a:solidFill>
+                                  <a:prstClr val="black"/>
+                                </a:solidFill>
+                                <a:latin typeface="Cambria Math" panose="02040503050406030204" pitchFamily="18" charset="0"/>
+                              </a:rPr>
+                              <m:t>𝑖</m:t>
+                            </m:r>
+                          </m:sub>
+                        </m:sSub>
+                        <m:r>
+                          <a:rPr lang="en-CA" sz="2800" i="1">
+                            <a:solidFill>
+                              <a:prstClr val="black"/>
+                            </a:solidFill>
+                            <a:latin typeface="Cambria Math" panose="02040503050406030204" pitchFamily="18" charset="0"/>
+                          </a:rPr>
+                          <m:t>,</m:t>
+                        </m:r>
+                        <m:sSub>
+                          <m:sSubPr>
+                            <m:ctrlPr>
+                              <a:rPr lang="en-CA" sz="2800" i="1">
+                                <a:solidFill>
+                                  <a:prstClr val="black"/>
+                                </a:solidFill>
+                                <a:latin typeface="Cambria Math"/>
+                              </a:rPr>
+                            </m:ctrlPr>
+                          </m:sSubPr>
+                          <m:e>
+                            <m:r>
+                              <a:rPr lang="en-CA" sz="2800" i="1">
+                                <a:solidFill>
+                                  <a:prstClr val="black"/>
+                                </a:solidFill>
+                                <a:latin typeface="Cambria Math" panose="02040503050406030204" pitchFamily="18" charset="0"/>
+                              </a:rPr>
+                              <m:t>𝑎</m:t>
+                            </m:r>
+                          </m:e>
+                          <m:sub>
+                            <m:r>
+                              <a:rPr lang="en-CA" sz="2800" i="1">
+                                <a:solidFill>
+                                  <a:prstClr val="black"/>
+                                </a:solidFill>
+                                <a:latin typeface="Cambria Math" panose="02040503050406030204" pitchFamily="18" charset="0"/>
+                              </a:rPr>
+                              <m:t>𝑗</m:t>
+                            </m:r>
+                          </m:sub>
+                        </m:sSub>
+                      </m:e>
+                    </m:d>
+                    <m:r>
+                      <a:rPr lang="en-CA" sz="2800" i="1">
+                        <a:solidFill>
+                          <a:prstClr val="black"/>
+                        </a:solidFill>
+                        <a:latin typeface="Cambria Math" panose="02040503050406030204" pitchFamily="18" charset="0"/>
+                      </a:rPr>
+                      <m:t>=</m:t>
+                    </m:r>
+                  </m:oMath>
+                </a14:m>
+                <a:r>
+                  <a:rPr lang="en-CA" sz="2800" dirty="0" smtClean="0">
+                    <a:solidFill>
+                      <a:prstClr val="black"/>
+                    </a:solidFill>
+                  </a:rPr>
+                  <a:t> </a:t>
+                </a:r>
+                <a14:m>
+                  <m:oMath xmlns:m="http://schemas.openxmlformats.org/officeDocument/2006/math">
+                    <m:nary>
+                      <m:naryPr>
+                        <m:chr m:val="∑"/>
+                        <m:supHide m:val="on"/>
+                        <m:ctrlPr>
+                          <a:rPr lang="en-US" sz="2800" b="0" i="1" dirty="0" smtClean="0">
+                            <a:solidFill>
+                              <a:prstClr val="black"/>
+                            </a:solidFill>
+                            <a:latin typeface="Cambria Math"/>
+                          </a:rPr>
+                        </m:ctrlPr>
+                      </m:naryPr>
+                      <m:sub>
+                        <m:r>
+                          <m:rPr>
+                            <m:brk m:alnAt="7"/>
+                          </m:rPr>
+                          <a:rPr lang="en-US" sz="2800" b="0" i="1" dirty="0" smtClean="0">
+                            <a:solidFill>
+                              <a:prstClr val="black"/>
+                            </a:solidFill>
+                            <a:latin typeface="Cambria Math"/>
+                          </a:rPr>
+                          <m:t>(</m:t>
+                        </m:r>
+                        <m:r>
+                          <a:rPr lang="en-US" sz="2800" b="0" i="1" dirty="0" smtClean="0">
+                            <a:solidFill>
+                              <a:prstClr val="black"/>
+                            </a:solidFill>
+                            <a:latin typeface="Cambria Math"/>
+                          </a:rPr>
+                          <m:t>𝑘</m:t>
+                        </m:r>
+                        <m:r>
+                          <a:rPr lang="en-US" sz="2800" b="0" i="1" dirty="0" smtClean="0">
+                            <a:solidFill>
+                              <a:prstClr val="black"/>
+                            </a:solidFill>
+                            <a:latin typeface="Cambria Math"/>
+                          </a:rPr>
+                          <m:t>∈</m:t>
+                        </m:r>
+                        <m:r>
+                          <a:rPr lang="en-US" sz="2800" b="0" i="1" dirty="0" smtClean="0">
+                            <a:solidFill>
+                              <a:prstClr val="black"/>
+                            </a:solidFill>
+                            <a:latin typeface="Cambria Math"/>
+                          </a:rPr>
+                          <m:t>𝑃</m:t>
+                        </m:r>
+                        <m:r>
+                          <a:rPr lang="en-US" sz="2800" b="0" i="1" dirty="0" smtClean="0">
+                            <a:solidFill>
+                              <a:prstClr val="black"/>
+                            </a:solidFill>
+                            <a:latin typeface="Cambria Math"/>
+                          </a:rPr>
+                          <m:t>)</m:t>
+                        </m:r>
+                      </m:sub>
+                      <m:sup/>
+                      <m:e>
+                        <m:sSup>
+                          <m:sSupPr>
+                            <m:ctrlPr>
+                              <a:rPr lang="en-US" sz="2800" b="0" i="1" dirty="0" smtClean="0">
+                                <a:solidFill>
+                                  <a:prstClr val="black"/>
+                                </a:solidFill>
+                                <a:latin typeface="Cambria Math"/>
+                              </a:rPr>
+                            </m:ctrlPr>
+                          </m:sSupPr>
+                          <m:e>
+                            <m:r>
+                              <a:rPr lang="en-US" sz="2800" b="0" i="1" dirty="0" smtClean="0">
+                                <a:solidFill>
+                                  <a:prstClr val="black"/>
+                                </a:solidFill>
+                                <a:latin typeface="Cambria Math"/>
+                              </a:rPr>
+                              <m:t>10</m:t>
+                            </m:r>
+                          </m:e>
+                          <m:sup>
+                            <m:r>
+                              <a:rPr lang="en-US" sz="2800" b="0" i="1" dirty="0" smtClean="0">
+                                <a:solidFill>
+                                  <a:prstClr val="black"/>
+                                </a:solidFill>
+                                <a:latin typeface="Cambria Math"/>
+                              </a:rPr>
+                              <m:t>1−</m:t>
+                            </m:r>
+                            <m:r>
+                              <a:rPr lang="en-US" sz="2800" b="0" i="1" dirty="0" smtClean="0">
+                                <a:solidFill>
+                                  <a:prstClr val="black"/>
+                                </a:solidFill>
+                                <a:latin typeface="Cambria Math"/>
+                              </a:rPr>
+                              <m:t>𝑓𝑟𝑒𝑞</m:t>
+                            </m:r>
+                            <m:d>
+                              <m:dPr>
+                                <m:ctrlPr>
+                                  <a:rPr lang="en-US" sz="2800" b="0" i="1" dirty="0" smtClean="0">
+                                    <a:solidFill>
+                                      <a:prstClr val="black"/>
+                                    </a:solidFill>
+                                    <a:latin typeface="Cambria Math"/>
+                                  </a:rPr>
+                                </m:ctrlPr>
+                              </m:dPr>
+                              <m:e>
+                                <m:r>
+                                  <a:rPr lang="en-US" sz="2800" b="0" i="1" dirty="0" smtClean="0">
+                                    <a:solidFill>
+                                      <a:prstClr val="black"/>
+                                    </a:solidFill>
+                                    <a:latin typeface="Cambria Math"/>
+                                  </a:rPr>
+                                  <m:t>𝑘</m:t>
+                                </m:r>
+                              </m:e>
+                            </m:d>
+                          </m:sup>
+                        </m:sSup>
+                        <m:r>
+                          <a:rPr lang="en-US" sz="2800" b="0" i="1" dirty="0" smtClean="0">
+                            <a:solidFill>
+                              <a:prstClr val="black"/>
+                            </a:solidFill>
+                            <a:latin typeface="Cambria Math"/>
+                          </a:rPr>
+                          <m:t>−1+</m:t>
+                        </m:r>
+                        <m:r>
+                          <a:rPr lang="en-US" sz="2800" b="0" i="1" dirty="0" smtClean="0">
+                            <a:solidFill>
+                              <a:prstClr val="black"/>
+                            </a:solidFill>
+                            <a:latin typeface="Cambria Math"/>
+                          </a:rPr>
+                          <m:t>𝑑𝑒𝑝𝑡h</m:t>
+                        </m:r>
+                        <m:sSup>
+                          <m:sSupPr>
+                            <m:ctrlPr>
+                              <a:rPr lang="en-US" sz="2800" b="0" i="1" dirty="0" smtClean="0">
+                                <a:solidFill>
+                                  <a:prstClr val="black"/>
+                                </a:solidFill>
+                                <a:latin typeface="Cambria Math"/>
+                              </a:rPr>
+                            </m:ctrlPr>
+                          </m:sSupPr>
+                          <m:e>
+                            <m:d>
+                              <m:dPr>
+                                <m:ctrlPr>
+                                  <a:rPr lang="en-US" sz="2800" b="0" i="1" dirty="0" smtClean="0">
+                                    <a:solidFill>
+                                      <a:prstClr val="black"/>
+                                    </a:solidFill>
+                                    <a:latin typeface="Cambria Math"/>
+                                  </a:rPr>
+                                </m:ctrlPr>
+                              </m:dPr>
+                              <m:e>
+                                <m:r>
+                                  <a:rPr lang="en-US" sz="2800" b="0" i="1" dirty="0" smtClean="0">
+                                    <a:solidFill>
+                                      <a:prstClr val="black"/>
+                                    </a:solidFill>
+                                    <a:latin typeface="Cambria Math"/>
+                                  </a:rPr>
+                                  <m:t>𝑘</m:t>
+                                </m:r>
+                              </m:e>
+                            </m:d>
+                          </m:e>
+                          <m:sup>
+                            <m:r>
+                              <a:rPr lang="en-US" sz="2800" b="0" i="1" dirty="0" smtClean="0">
+                                <a:solidFill>
+                                  <a:prstClr val="black"/>
+                                </a:solidFill>
+                                <a:latin typeface="Cambria Math"/>
+                              </a:rPr>
+                              <m:t>2</m:t>
+                            </m:r>
+                          </m:sup>
+                        </m:sSup>
+                      </m:e>
+                    </m:nary>
+                    <m:r>
+                      <a:rPr lang="en-US" sz="2800" b="0" i="1" dirty="0" smtClean="0">
+                        <a:solidFill>
+                          <a:prstClr val="black"/>
+                        </a:solidFill>
+                        <a:latin typeface="Cambria Math"/>
+                      </a:rPr>
+                      <m:t> </m:t>
+                    </m:r>
+                  </m:oMath>
+                </a14:m>
+                <a:endParaRPr lang="en-US" sz="2800" b="0" dirty="0" smtClean="0">
+                  <a:solidFill>
+                    <a:prstClr val="black"/>
+                  </a:solidFill>
+                </a:endParaRPr>
+              </a:p>
+              <a:p>
+                <a:pPr lvl="0">
+                  <a:lnSpc>
+                    <a:spcPct val="150000"/>
+                  </a:lnSpc>
+                  <a:buClr>
+                    <a:srgbClr val="FF6A19"/>
+                  </a:buClr>
+                </a:pPr>
+                <a14:m>
+                  <m:oMathPara xmlns:m="http://schemas.openxmlformats.org/officeDocument/2006/math">
+                    <m:oMathParaPr>
+                      <m:jc m:val="centerGroup"/>
+                    </m:oMathParaPr>
+                    <m:oMath xmlns:m="http://schemas.openxmlformats.org/officeDocument/2006/math">
+                      <m:r>
+                        <a:rPr lang="en-US" sz="2800" b="0" i="1" smtClean="0">
+                          <a:solidFill>
+                            <a:prstClr val="black"/>
+                          </a:solidFill>
+                          <a:latin typeface="Cambria Math"/>
+                        </a:rPr>
+                        <m:t>𝑃</m:t>
+                      </m:r>
+                      <m:r>
+                        <a:rPr lang="en-US" sz="2800" b="0" i="1" smtClean="0">
+                          <a:solidFill>
+                            <a:prstClr val="black"/>
+                          </a:solidFill>
+                          <a:latin typeface="Cambria Math"/>
+                        </a:rPr>
+                        <m:t>=</m:t>
+                      </m:r>
+                      <m:r>
+                        <a:rPr lang="en-US" sz="2800" b="0" i="1" smtClean="0">
+                          <a:solidFill>
+                            <a:prstClr val="black"/>
+                          </a:solidFill>
+                          <a:latin typeface="Cambria Math"/>
+                        </a:rPr>
+                        <m:t>𝑐𝑜𝑚𝑚𝑜𝑛</m:t>
+                      </m:r>
+                      <m:r>
+                        <a:rPr lang="en-US" sz="2800" b="0" i="1" smtClean="0">
+                          <a:solidFill>
+                            <a:prstClr val="black"/>
+                          </a:solidFill>
+                          <a:latin typeface="Cambria Math"/>
+                        </a:rPr>
+                        <m:t> </m:t>
+                      </m:r>
+                      <m:r>
+                        <a:rPr lang="en-US" sz="2800" b="0" i="1" smtClean="0">
+                          <a:solidFill>
+                            <a:prstClr val="black"/>
+                          </a:solidFill>
+                          <a:latin typeface="Cambria Math"/>
+                        </a:rPr>
+                        <m:t>𝑝𝑎𝑡h𝑠</m:t>
+                      </m:r>
+                      <m:r>
+                        <a:rPr lang="en-US" sz="2800" b="0" i="1" smtClean="0">
+                          <a:solidFill>
+                            <a:prstClr val="black"/>
+                          </a:solidFill>
+                          <a:latin typeface="Cambria Math"/>
+                        </a:rPr>
+                        <m:t> </m:t>
+                      </m:r>
+                      <m:r>
+                        <a:rPr lang="en-US" sz="2800" b="0" i="1" smtClean="0">
+                          <a:solidFill>
+                            <a:prstClr val="black"/>
+                          </a:solidFill>
+                          <a:latin typeface="Cambria Math"/>
+                        </a:rPr>
+                        <m:t>𝑏𝑒𝑡𝑤𝑒𝑒𝑛</m:t>
+                      </m:r>
+                      <m:r>
+                        <a:rPr lang="en-US" sz="2800" b="0" i="1" smtClean="0">
+                          <a:solidFill>
+                            <a:prstClr val="black"/>
+                          </a:solidFill>
+                          <a:latin typeface="Cambria Math"/>
+                        </a:rPr>
+                        <m:t> </m:t>
+                      </m:r>
+                      <m:r>
+                        <a:rPr lang="en-US" sz="2800" b="0" i="1" smtClean="0">
+                          <a:solidFill>
+                            <a:prstClr val="black"/>
+                          </a:solidFill>
+                          <a:latin typeface="Cambria Math"/>
+                        </a:rPr>
+                        <m:t>𝑖</m:t>
+                      </m:r>
+                      <m:r>
+                        <a:rPr lang="en-US" sz="2800" b="0" i="1" smtClean="0">
+                          <a:solidFill>
+                            <a:prstClr val="black"/>
+                          </a:solidFill>
+                          <a:latin typeface="Cambria Math"/>
+                        </a:rPr>
+                        <m:t> </m:t>
+                      </m:r>
+                      <m:r>
+                        <a:rPr lang="en-US" sz="2800" b="0" i="1" smtClean="0">
+                          <a:solidFill>
+                            <a:prstClr val="black"/>
+                          </a:solidFill>
+                          <a:latin typeface="Cambria Math"/>
+                        </a:rPr>
+                        <m:t>𝑎𝑛𝑑</m:t>
+                      </m:r>
+                      <m:r>
+                        <a:rPr lang="en-US" sz="2800" b="0" i="1" smtClean="0">
+                          <a:solidFill>
+                            <a:prstClr val="black"/>
+                          </a:solidFill>
+                          <a:latin typeface="Cambria Math"/>
+                        </a:rPr>
+                        <m:t> </m:t>
+                      </m:r>
+                      <m:r>
+                        <a:rPr lang="en-US" sz="2800" b="0" i="1" smtClean="0">
+                          <a:solidFill>
+                            <a:prstClr val="black"/>
+                          </a:solidFill>
+                          <a:latin typeface="Cambria Math"/>
+                        </a:rPr>
+                        <m:t>𝑗</m:t>
+                      </m:r>
+                    </m:oMath>
+                  </m:oMathPara>
+                </a14:m>
+                <a:endParaRPr lang="en-CA" sz="2800" dirty="0">
                   <a:solidFill>
                     <a:prstClr val="black"/>
                   </a:solidFill>
@@ -5759,162 +6328,7 @@
                     <a:srgbClr val="FF6A19"/>
                   </a:buClr>
                 </a:pPr>
-                <a14:m>
-                  <m:oMathPara xmlns:m="http://schemas.openxmlformats.org/officeDocument/2006/math">
-                    <m:oMathParaPr>
-                      <m:jc m:val="centerGroup"/>
-                    </m:oMathParaPr>
-                    <m:oMath xmlns:m="http://schemas.openxmlformats.org/officeDocument/2006/math">
-                      <m:sSub>
-                        <m:sSubPr>
-                          <m:ctrlPr>
-                            <a:rPr lang="en-CA" sz="3600" i="1">
-                              <a:solidFill>
-                                <a:prstClr val="black"/>
-                              </a:solidFill>
-                              <a:latin typeface="Cambria Math" panose="02040503050406030204" pitchFamily="18" charset="0"/>
-                            </a:rPr>
-                          </m:ctrlPr>
-                        </m:sSubPr>
-                        <m:e>
-                          <m:r>
-                            <a:rPr lang="en-CA" sz="3600" i="1">
-                              <a:solidFill>
-                                <a:prstClr val="black"/>
-                              </a:solidFill>
-                              <a:latin typeface="Cambria Math" panose="02040503050406030204" pitchFamily="18" charset="0"/>
-                            </a:rPr>
-                            <m:t>𝑤</m:t>
-                          </m:r>
-                        </m:e>
-                        <m:sub>
-                          <m:r>
-                            <a:rPr lang="en-CA" sz="3600" i="1">
-                              <a:solidFill>
-                                <a:prstClr val="black"/>
-                              </a:solidFill>
-                              <a:latin typeface="Cambria Math" panose="02040503050406030204" pitchFamily="18" charset="0"/>
-                            </a:rPr>
-                            <m:t>𝑊𝑖𝑘𝑖</m:t>
-                          </m:r>
-                        </m:sub>
-                      </m:sSub>
-                      <m:d>
-                        <m:dPr>
-                          <m:ctrlPr>
-                            <a:rPr lang="en-CA" sz="3600" i="1">
-                              <a:solidFill>
-                                <a:prstClr val="black"/>
-                              </a:solidFill>
-                              <a:latin typeface="Cambria Math" panose="02040503050406030204" pitchFamily="18" charset="0"/>
-                            </a:rPr>
-                          </m:ctrlPr>
-                        </m:dPr>
-                        <m:e>
-                          <m:sSub>
-                            <m:sSubPr>
-                              <m:ctrlPr>
-                                <a:rPr lang="en-CA" sz="3600" i="1">
-                                  <a:solidFill>
-                                    <a:prstClr val="black"/>
-                                  </a:solidFill>
-                                  <a:latin typeface="Cambria Math" panose="02040503050406030204" pitchFamily="18" charset="0"/>
-                                </a:rPr>
-                              </m:ctrlPr>
-                            </m:sSubPr>
-                            <m:e>
-                              <m:r>
-                                <a:rPr lang="en-CA" sz="3600" i="1">
-                                  <a:solidFill>
-                                    <a:prstClr val="black"/>
-                                  </a:solidFill>
-                                  <a:latin typeface="Cambria Math" panose="02040503050406030204" pitchFamily="18" charset="0"/>
-                                </a:rPr>
-                                <m:t>𝑎</m:t>
-                              </m:r>
-                            </m:e>
-                            <m:sub>
-                              <m:r>
-                                <a:rPr lang="en-CA" sz="3600" i="1">
-                                  <a:solidFill>
-                                    <a:prstClr val="black"/>
-                                  </a:solidFill>
-                                  <a:latin typeface="Cambria Math" panose="02040503050406030204" pitchFamily="18" charset="0"/>
-                                </a:rPr>
-                                <m:t>𝑖</m:t>
-                              </m:r>
-                            </m:sub>
-                          </m:sSub>
-                          <m:r>
-                            <a:rPr lang="en-CA" sz="3600" i="1">
-                              <a:solidFill>
-                                <a:prstClr val="black"/>
-                              </a:solidFill>
-                              <a:latin typeface="Cambria Math" panose="02040503050406030204" pitchFamily="18" charset="0"/>
-                            </a:rPr>
-                            <m:t>,</m:t>
-                          </m:r>
-                          <m:sSub>
-                            <m:sSubPr>
-                              <m:ctrlPr>
-                                <a:rPr lang="en-CA" sz="3600" i="1">
-                                  <a:solidFill>
-                                    <a:prstClr val="black"/>
-                                  </a:solidFill>
-                                  <a:latin typeface="Cambria Math" panose="02040503050406030204" pitchFamily="18" charset="0"/>
-                                </a:rPr>
-                              </m:ctrlPr>
-                            </m:sSubPr>
-                            <m:e>
-                              <m:r>
-                                <a:rPr lang="en-CA" sz="3600" i="1">
-                                  <a:solidFill>
-                                    <a:prstClr val="black"/>
-                                  </a:solidFill>
-                                  <a:latin typeface="Cambria Math" panose="02040503050406030204" pitchFamily="18" charset="0"/>
-                                </a:rPr>
-                                <m:t>𝑎</m:t>
-                              </m:r>
-                            </m:e>
-                            <m:sub>
-                              <m:r>
-                                <a:rPr lang="en-CA" sz="3600" i="1">
-                                  <a:solidFill>
-                                    <a:prstClr val="black"/>
-                                  </a:solidFill>
-                                  <a:latin typeface="Cambria Math" panose="02040503050406030204" pitchFamily="18" charset="0"/>
-                                </a:rPr>
-                                <m:t>𝑗</m:t>
-                              </m:r>
-                            </m:sub>
-                          </m:sSub>
-                        </m:e>
-                      </m:d>
-                      <m:r>
-                        <a:rPr lang="en-CA" sz="3600" i="1">
-                          <a:solidFill>
-                            <a:prstClr val="black"/>
-                          </a:solidFill>
-                          <a:latin typeface="Cambria Math" panose="02040503050406030204" pitchFamily="18" charset="0"/>
-                        </a:rPr>
-                        <m:t>= …</m:t>
-                      </m:r>
-                    </m:oMath>
-                  </m:oMathPara>
-                </a14:m>
-                <a:endParaRPr lang="en-CA" sz="3600" dirty="0">
-                  <a:solidFill>
-                    <a:prstClr val="black"/>
-                  </a:solidFill>
-                </a:endParaRPr>
-              </a:p>
-              <a:p>
-                <a:pPr lvl="0">
-                  <a:buClr>
-                    <a:srgbClr val="FF6A19"/>
-                  </a:buClr>
-                </a:pPr>
-                <a:endParaRPr lang="en-CA" sz="3600" dirty="0">
+                <a:endParaRPr lang="en-CA" sz="2800" dirty="0">
                   <a:solidFill>
                     <a:prstClr val="black"/>
                   </a:solidFill>
@@ -5933,7 +6347,7 @@
                     </m:oMathParaPr>
                     <m:oMath xmlns:m="http://schemas.openxmlformats.org/officeDocument/2006/math">
                       <m:r>
-                        <a:rPr lang="en-CA" sz="3600" i="1">
+                        <a:rPr lang="en-CA" sz="2800" i="1">
                           <a:solidFill>
                             <a:prstClr val="black"/>
                           </a:solidFill>
@@ -5944,11 +6358,11 @@
                       <m:d>
                         <m:dPr>
                           <m:ctrlPr>
-                            <a:rPr lang="en-CA" sz="3600" i="1">
+                            <a:rPr lang="en-CA" sz="2800" i="1">
                               <a:solidFill>
                                 <a:prstClr val="black"/>
                               </a:solidFill>
-                              <a:latin typeface="Cambria Math" panose="02040503050406030204" pitchFamily="18" charset="0"/>
+                              <a:latin typeface="Cambria Math"/>
                             </a:rPr>
                           </m:ctrlPr>
                         </m:dPr>
@@ -5956,17 +6370,17 @@
                           <m:sSub>
                             <m:sSubPr>
                               <m:ctrlPr>
-                                <a:rPr lang="en-CA" sz="3600" i="1">
+                                <a:rPr lang="en-CA" sz="2800" i="1">
                                   <a:solidFill>
                                     <a:prstClr val="black"/>
                                   </a:solidFill>
-                                  <a:latin typeface="Cambria Math" panose="02040503050406030204" pitchFamily="18" charset="0"/>
+                                  <a:latin typeface="Cambria Math"/>
                                 </a:rPr>
                               </m:ctrlPr>
                             </m:sSubPr>
                             <m:e>
                               <m:r>
-                                <a:rPr lang="en-CA" sz="3600" i="1">
+                                <a:rPr lang="en-CA" sz="2800" i="1">
                                   <a:solidFill>
                                     <a:prstClr val="black"/>
                                   </a:solidFill>
@@ -5977,7 +6391,7 @@
                             </m:e>
                             <m:sub>
                               <m:r>
-                                <a:rPr lang="en-CA" sz="3600" i="1">
+                                <a:rPr lang="en-CA" sz="2800" i="1">
                                   <a:solidFill>
                                     <a:prstClr val="black"/>
                                   </a:solidFill>
@@ -5988,7 +6402,7 @@
                             </m:sub>
                           </m:sSub>
                           <m:r>
-                            <a:rPr lang="en-CA" sz="3600" i="1">
+                            <a:rPr lang="en-CA" sz="2800" i="1">
                               <a:solidFill>
                                 <a:prstClr val="black"/>
                               </a:solidFill>
@@ -5999,17 +6413,17 @@
                           <m:sSub>
                             <m:sSubPr>
                               <m:ctrlPr>
-                                <a:rPr lang="en-CA" sz="3600" i="1">
+                                <a:rPr lang="en-CA" sz="2800" i="1">
                                   <a:solidFill>
                                     <a:prstClr val="black"/>
                                   </a:solidFill>
-                                  <a:latin typeface="Cambria Math" panose="02040503050406030204" pitchFamily="18" charset="0"/>
+                                  <a:latin typeface="Cambria Math"/>
                                 </a:rPr>
                               </m:ctrlPr>
                             </m:sSubPr>
                             <m:e>
                               <m:r>
-                                <a:rPr lang="en-CA" sz="3600" i="1">
+                                <a:rPr lang="en-CA" sz="2800" i="1">
                                   <a:solidFill>
                                     <a:prstClr val="black"/>
                                   </a:solidFill>
@@ -6020,7 +6434,7 @@
                             </m:e>
                             <m:sub>
                               <m:r>
-                                <a:rPr lang="en-CA" sz="3600" i="1">
+                                <a:rPr lang="en-CA" sz="2800" i="1">
                                   <a:solidFill>
                                     <a:prstClr val="black"/>
                                   </a:solidFill>
@@ -6033,7 +6447,7 @@
                         </m:e>
                       </m:d>
                       <m:r>
-                        <a:rPr lang="en-CA" sz="3600" i="1">
+                        <a:rPr lang="en-CA" sz="2800" i="1">
                           <a:solidFill>
                             <a:prstClr val="black"/>
                           </a:solidFill>
@@ -6042,7 +6456,7 @@
                         <m:t>=</m:t>
                       </m:r>
                       <m:r>
-                        <a:rPr lang="en-CA" sz="3600" i="1">
+                        <a:rPr lang="en-CA" sz="2800" i="1">
                           <a:solidFill>
                             <a:prstClr val="black"/>
                           </a:solidFill>
@@ -6051,7 +6465,7 @@
                         <m:t>𝛼</m:t>
                       </m:r>
                       <m:r>
-                        <a:rPr lang="en-CA" sz="3600" i="1">
+                        <a:rPr lang="en-CA" sz="2800" i="1">
                           <a:solidFill>
                             <a:prstClr val="black"/>
                           </a:solidFill>
@@ -6062,17 +6476,17 @@
                       <m:sSub>
                         <m:sSubPr>
                           <m:ctrlPr>
-                            <a:rPr lang="en-CA" sz="3600" i="1">
+                            <a:rPr lang="en-CA" sz="2800" i="1">
                               <a:solidFill>
                                 <a:prstClr val="black"/>
                               </a:solidFill>
-                              <a:latin typeface="Cambria Math" panose="02040503050406030204" pitchFamily="18" charset="0"/>
+                              <a:latin typeface="Cambria Math"/>
                             </a:rPr>
                           </m:ctrlPr>
                         </m:sSubPr>
                         <m:e>
                           <m:r>
-                            <a:rPr lang="en-CA" sz="3600" i="1">
+                            <a:rPr lang="en-CA" sz="2800" i="1">
                               <a:solidFill>
                                 <a:prstClr val="black"/>
                               </a:solidFill>
@@ -6083,7 +6497,7 @@
                         </m:e>
                         <m:sub>
                           <m:r>
-                            <a:rPr lang="en-CA" sz="3600" i="1">
+                            <a:rPr lang="en-CA" sz="2800" i="1">
                               <a:solidFill>
                                 <a:prstClr val="black"/>
                               </a:solidFill>
@@ -6094,7 +6508,7 @@
                         </m:sub>
                       </m:sSub>
                       <m:r>
-                        <a:rPr lang="en-CA" sz="3600" i="1">
+                        <a:rPr lang="en-CA" sz="2800" i="1">
                           <a:solidFill>
                             <a:prstClr val="black"/>
                           </a:solidFill>
@@ -6103,7 +6517,7 @@
                         <m:t>+(1−</m:t>
                       </m:r>
                       <m:r>
-                        <a:rPr lang="en-CA" sz="3600" i="1">
+                        <a:rPr lang="en-CA" sz="2800" i="1">
                           <a:solidFill>
                             <a:prstClr val="black"/>
                           </a:solidFill>
@@ -6112,7 +6526,7 @@
                         <m:t>𝛼</m:t>
                       </m:r>
                       <m:r>
-                        <a:rPr lang="en-CA" sz="3600" i="1">
+                        <a:rPr lang="en-CA" sz="2800" i="1">
                           <a:solidFill>
                             <a:prstClr val="black"/>
                           </a:solidFill>
@@ -6123,17 +6537,17 @@
                       <m:sSub>
                         <m:sSubPr>
                           <m:ctrlPr>
-                            <a:rPr lang="en-CA" sz="3600" i="1">
+                            <a:rPr lang="en-CA" sz="2800" i="1">
                               <a:solidFill>
                                 <a:prstClr val="black"/>
                               </a:solidFill>
-                              <a:latin typeface="Cambria Math" panose="02040503050406030204" pitchFamily="18" charset="0"/>
+                              <a:latin typeface="Cambria Math"/>
                             </a:rPr>
                           </m:ctrlPr>
                         </m:sSubPr>
                         <m:e>
                           <m:r>
-                            <a:rPr lang="en-CA" sz="3600" i="1">
+                            <a:rPr lang="en-CA" sz="2800" i="1">
                               <a:solidFill>
                                 <a:prstClr val="black"/>
                               </a:solidFill>
@@ -6144,7 +6558,7 @@
                         </m:e>
                         <m:sub>
                           <m:r>
-                            <a:rPr lang="en-CA" sz="3600" i="1">
+                            <a:rPr lang="en-CA" sz="2800" i="1">
                               <a:solidFill>
                                 <a:prstClr val="black"/>
                               </a:solidFill>
@@ -6157,7 +6571,7 @@
                     </m:oMath>
                   </m:oMathPara>
                 </a14:m>
-                <a:endParaRPr lang="en-CA" dirty="0"/>
+                <a:endParaRPr lang="en-CA" sz="2800" dirty="0"/>
               </a:p>
             </p:txBody>
           </p:sp>
@@ -6174,12 +6588,12 @@
             <p:spPr>
               <a:xfrm>
                 <a:off x="8861239" y="13493758"/>
-                <a:ext cx="8135880" cy="3917098"/>
+                <a:ext cx="8135880" cy="4008533"/>
               </a:xfrm>
               <a:prstGeom prst="rect">
                 <a:avLst/>
               </a:prstGeom>
-              <a:blipFill>
+              <a:blipFill rotWithShape="1">
                 <a:blip r:embed="rId8"/>
                 <a:stretch>
                   <a:fillRect/>
@@ -6191,7 +6605,7 @@
               <a:lstStyle/>
               <a:p>
                 <a:r>
-                  <a:rPr lang="en-CA">
+                  <a:rPr lang="en-US">
                     <a:noFill/>
                   </a:rPr>
                   <a:t> </a:t>
@@ -6301,6 +6715,66 @@
           </a:p>
         </p:txBody>
       </p:sp>
+      <p:pic>
+        <p:nvPicPr>
+          <p:cNvPr id="3" name="Picture 2"/>
+          <p:cNvPicPr>
+            <a:picLocks noChangeAspect="1"/>
+          </p:cNvPicPr>
+          <p:nvPr/>
+        </p:nvPicPr>
+        <p:blipFill>
+          <a:blip r:embed="rId9">
+            <a:extLst>
+              <a:ext uri="{28A0092B-C50C-407E-A947-70E740481C1C}">
+                <a14:useLocalDpi xmlns:a14="http://schemas.microsoft.com/office/drawing/2010/main" val="0"/>
+              </a:ext>
+            </a:extLst>
+          </a:blip>
+          <a:stretch>
+            <a:fillRect/>
+          </a:stretch>
+        </p:blipFill>
+        <p:spPr>
+          <a:xfrm>
+            <a:off x="22580279" y="14731800"/>
+            <a:ext cx="8824631" cy="5137584"/>
+          </a:xfrm>
+          <a:prstGeom prst="rect">
+            <a:avLst/>
+          </a:prstGeom>
+        </p:spPr>
+      </p:pic>
+      <p:pic>
+        <p:nvPicPr>
+          <p:cNvPr id="20" name="Picture 19"/>
+          <p:cNvPicPr>
+            <a:picLocks noChangeAspect="1"/>
+          </p:cNvPicPr>
+          <p:nvPr/>
+        </p:nvPicPr>
+        <p:blipFill>
+          <a:blip r:embed="rId10">
+            <a:extLst>
+              <a:ext uri="{28A0092B-C50C-407E-A947-70E740481C1C}">
+                <a14:useLocalDpi xmlns:a14="http://schemas.microsoft.com/office/drawing/2010/main" val="0"/>
+              </a:ext>
+            </a:extLst>
+          </a:blip>
+          <a:stretch>
+            <a:fillRect/>
+          </a:stretch>
+        </p:blipFill>
+        <p:spPr>
+          <a:xfrm>
+            <a:off x="22823740" y="4972800"/>
+            <a:ext cx="8423515" cy="5277112"/>
+          </a:xfrm>
+          <a:prstGeom prst="rect">
+            <a:avLst/>
+          </a:prstGeom>
+        </p:spPr>
+      </p:pic>
     </p:spTree>
     <p:extLst>
       <p:ext uri="{BB962C8B-B14F-4D97-AF65-F5344CB8AC3E}">
@@ -6569,7 +7043,7 @@
   <a:extraClrSchemeLst/>
   <a:extLst>
     <a:ext uri="{05A4C25C-085E-4340-85A3-A5531E510DB2}">
-      <thm15:themeFamily xmlns:thm15="http://schemas.microsoft.com/office/thememl/2012/main" name="Office Theme" id="{62F939B6-93AF-4DB8-9C6B-D6C7DFDC589F}" vid="{4A3C46E8-61CC-4603-A589-7422A47A8E4A}"/>
+      <thm15:themeFamily xmlns:thm15="http://schemas.microsoft.com/office/thememl/2012/main" xmlns="" name="Office Theme" id="{62F939B6-93AF-4DB8-9C6B-D6C7DFDC589F}" vid="{4A3C46E8-61CC-4603-A589-7422A47A8E4A}"/>
     </a:ext>
   </a:extLst>
 </a:theme>

</xml_diff>

<commit_message>
Slight modifications to poster
</commit_message>
<xml_diff>
--- a/poster/poster.pptx
+++ b/poster/poster.pptx
@@ -106,7 +106,7 @@
   </p:defaultTextStyle>
   <p:extLst>
     <p:ext uri="{EFAFB233-063F-42B5-8137-9DF3F51BA10A}">
-      <p15:sldGuideLst xmlns:p15="http://schemas.microsoft.com/office/powerpoint/2012/main" xmlns="">
+      <p15:sldGuideLst xmlns:p15="http://schemas.microsoft.com/office/powerpoint/2012/main">
         <p15:guide id="1" orient="horz" pos="6912" userDrawn="1">
           <p15:clr>
             <a:srgbClr val="A4A3A4"/>
@@ -3743,8 +3743,12 @@
               <a:buChar char="▶"/>
             </a:pPr>
             <a:r>
+              <a:rPr lang="en-CA" sz="3600" dirty="0" smtClean="0"/>
+              <a:t>We used </a:t>
+            </a:r>
+            <a:r>
               <a:rPr lang="en-CA" sz="3600" dirty="0"/>
-              <a:t>We used social and classification data </a:t>
+              <a:t>social and classification data </a:t>
             </a:r>
             <a:r>
               <a:rPr lang="en-CA" sz="3600" dirty="0" smtClean="0"/>
@@ -3890,8 +3894,12 @@
               <a:buChar char="▶"/>
             </a:pPr>
             <a:r>
+              <a:rPr lang="en-CA" sz="3600" dirty="0" smtClean="0"/>
+              <a:t>Sample 10 </a:t>
+            </a:r>
+            <a:r>
               <a:rPr lang="en-CA" sz="3600" dirty="0"/>
-              <a:t>Sample 10 million tweets across 50,000 users.</a:t>
+              <a:t>million tweets across 50,000 users.</a:t>
             </a:r>
           </a:p>
           <a:p>
@@ -3903,8 +3911,12 @@
               <a:buChar char="▶"/>
             </a:pPr>
             <a:r>
+              <a:rPr lang="en-CA" sz="3600" dirty="0" smtClean="0"/>
+              <a:t>Newest </a:t>
+            </a:r>
+            <a:r>
               <a:rPr lang="en-CA" sz="3600" dirty="0"/>
-              <a:t>Newest tweeted is a user’s primary activity, secondary activities are those mentioned in older tweets.</a:t>
+              <a:t>tweeted is a user’s primary activity, secondary activities are those mentioned in older tweets.</a:t>
             </a:r>
           </a:p>
           <a:p>
@@ -3980,12 +3992,12 @@
               <a:t>77 activity </a:t>
             </a:r>
             <a:r>
-              <a:rPr lang="en-CA" sz="3600" dirty="0">
+              <a:rPr lang="en-CA" sz="3600" dirty="0" smtClean="0">
                 <a:solidFill>
                   <a:prstClr val="black"/>
                 </a:solidFill>
               </a:rPr>
-              <a:t>nodes.</a:t>
+              <a:t>nodes</a:t>
             </a:r>
             <a:endParaRPr lang="en-CA" sz="3600" b="0" i="1" dirty="0">
               <a:latin typeface="Cambria Math" panose="02040503050406030204" pitchFamily="18" charset="0"/>
@@ -4740,7 +4752,7 @@
           <p:nvPr>
             <p:extLst>
               <p:ext uri="{D42A27DB-BD31-4B8C-83A1-F6EECF244321}">
-                <p14:modId xmlns:p14="http://schemas.microsoft.com/office/powerpoint/2010/main" val="438742233"/>
+                <p14:modId xmlns:p14="http://schemas.microsoft.com/office/powerpoint/2010/main" val="3102142493"/>
               </p:ext>
             </p:extLst>
           </p:nvPr>
@@ -4759,28 +4771,28 @@
                 <a:gridCol w="2453135">
                   <a:extLst>
                     <a:ext uri="{9D8B030D-6E8A-4147-A177-3AD203B41FA5}">
-                      <a16:colId xmlns:a16="http://schemas.microsoft.com/office/drawing/2014/main" xmlns="" val="3234236087"/>
+                      <a16:colId xmlns:a16="http://schemas.microsoft.com/office/drawing/2014/main" val="3234236087"/>
                     </a:ext>
                   </a:extLst>
                 </a:gridCol>
                 <a:gridCol w="2453135">
                   <a:extLst>
                     <a:ext uri="{9D8B030D-6E8A-4147-A177-3AD203B41FA5}">
-                      <a16:colId xmlns:a16="http://schemas.microsoft.com/office/drawing/2014/main" xmlns="" val="2361038209"/>
+                      <a16:colId xmlns:a16="http://schemas.microsoft.com/office/drawing/2014/main" val="2361038209"/>
                     </a:ext>
                   </a:extLst>
                 </a:gridCol>
                 <a:gridCol w="2453135">
                   <a:extLst>
                     <a:ext uri="{9D8B030D-6E8A-4147-A177-3AD203B41FA5}">
-                      <a16:colId xmlns:a16="http://schemas.microsoft.com/office/drawing/2014/main" xmlns="" val="600948068"/>
+                      <a16:colId xmlns:a16="http://schemas.microsoft.com/office/drawing/2014/main" val="600948068"/>
                     </a:ext>
                   </a:extLst>
                 </a:gridCol>
                 <a:gridCol w="2453135">
                   <a:extLst>
                     <a:ext uri="{9D8B030D-6E8A-4147-A177-3AD203B41FA5}">
-                      <a16:colId xmlns:a16="http://schemas.microsoft.com/office/drawing/2014/main" xmlns="" val="3971599481"/>
+                      <a16:colId xmlns:a16="http://schemas.microsoft.com/office/drawing/2014/main" val="3971599481"/>
                     </a:ext>
                   </a:extLst>
                 </a:gridCol>
@@ -4793,9 +4805,10 @@
                     <a:p>
                       <a:pPr algn="ctr"/>
                       <a:r>
-                        <a:rPr lang="en-CA" sz="2800" dirty="0"/>
-                        <a:t>Activities</a:t>
+                        <a:rPr lang="en-CA" sz="2800" smtClean="0"/>
+                        <a:t>Sample Activities</a:t>
                       </a:r>
+                      <a:endParaRPr lang="en-CA" sz="2800" dirty="0"/>
                     </a:p>
                   </a:txBody>
                   <a:tcPr marL="53521" marR="53521" marT="26760" marB="26760"/>
@@ -4853,7 +4866,7 @@
                 </a:tc>
                 <a:extLst>
                   <a:ext uri="{0D108BD9-81ED-4DB2-BD59-A6C34878D82A}">
-                    <a16:rowId xmlns:a16="http://schemas.microsoft.com/office/drawing/2014/main" xmlns="" val="1488854628"/>
+                    <a16:rowId xmlns:a16="http://schemas.microsoft.com/office/drawing/2014/main" val="1488854628"/>
                   </a:ext>
                 </a:extLst>
               </a:tr>
@@ -4956,7 +4969,7 @@
                 </a:tc>
                 <a:extLst>
                   <a:ext uri="{0D108BD9-81ED-4DB2-BD59-A6C34878D82A}">
-                    <a16:rowId xmlns:a16="http://schemas.microsoft.com/office/drawing/2014/main" xmlns="" val="2730295962"/>
+                    <a16:rowId xmlns:a16="http://schemas.microsoft.com/office/drawing/2014/main" val="2730295962"/>
                   </a:ext>
                 </a:extLst>
               </a:tr>
@@ -5061,7 +5074,7 @@
                 </a:tc>
                 <a:extLst>
                   <a:ext uri="{0D108BD9-81ED-4DB2-BD59-A6C34878D82A}">
-                    <a16:rowId xmlns:a16="http://schemas.microsoft.com/office/drawing/2014/main" xmlns="" val="944698896"/>
+                    <a16:rowId xmlns:a16="http://schemas.microsoft.com/office/drawing/2014/main" val="944698896"/>
                   </a:ext>
                 </a:extLst>
               </a:tr>
@@ -5126,7 +5139,7 @@
                 </a:tc>
                 <a:extLst>
                   <a:ext uri="{0D108BD9-81ED-4DB2-BD59-A6C34878D82A}">
-                    <a16:rowId xmlns:a16="http://schemas.microsoft.com/office/drawing/2014/main" xmlns="" val="542318825"/>
+                    <a16:rowId xmlns:a16="http://schemas.microsoft.com/office/drawing/2014/main" val="542318825"/>
                   </a:ext>
                 </a:extLst>
               </a:tr>
@@ -5191,7 +5204,7 @@
                 </a:tc>
                 <a:extLst>
                   <a:ext uri="{0D108BD9-81ED-4DB2-BD59-A6C34878D82A}">
-                    <a16:rowId xmlns:a16="http://schemas.microsoft.com/office/drawing/2014/main" xmlns="" val="2736929169"/>
+                    <a16:rowId xmlns:a16="http://schemas.microsoft.com/office/drawing/2014/main" val="2736929169"/>
                   </a:ext>
                 </a:extLst>
               </a:tr>
@@ -5240,7 +5253,7 @@
                               <a:solidFill>
                                 <a:prstClr val="black"/>
                               </a:solidFill>
-                              <a:latin typeface="Cambria Math"/>
+                              <a:latin typeface="Cambria Math" panose="02040503050406030204" pitchFamily="18" charset="0"/>
                             </a:rPr>
                           </m:ctrlPr>
                         </m:sSubPr>
@@ -5274,7 +5287,7 @@
                               <a:solidFill>
                                 <a:prstClr val="black"/>
                               </a:solidFill>
-                              <a:latin typeface="Cambria Math"/>
+                              <a:latin typeface="Cambria Math" panose="02040503050406030204" pitchFamily="18" charset="0"/>
                             </a:rPr>
                           </m:ctrlPr>
                         </m:dPr>
@@ -5286,7 +5299,7 @@
                                   <a:solidFill>
                                     <a:prstClr val="black"/>
                                   </a:solidFill>
-                                  <a:latin typeface="Cambria Math"/>
+                                  <a:latin typeface="Cambria Math" panose="02040503050406030204" pitchFamily="18" charset="0"/>
                                 </a:rPr>
                               </m:ctrlPr>
                             </m:sSubPr>
@@ -5329,7 +5342,7 @@
                                   <a:solidFill>
                                     <a:prstClr val="black"/>
                                   </a:solidFill>
-                                  <a:latin typeface="Cambria Math"/>
+                                  <a:latin typeface="Cambria Math" panose="02040503050406030204" pitchFamily="18" charset="0"/>
                                 </a:rPr>
                               </m:ctrlPr>
                             </m:sSubPr>
@@ -5374,7 +5387,7 @@
                               <a:solidFill>
                                 <a:prstClr val="black"/>
                               </a:solidFill>
-                              <a:latin typeface="Cambria Math"/>
+                              <a:latin typeface="Cambria Math" panose="02040503050406030204" pitchFamily="18" charset="0"/>
                               <a:ea typeface="Cambria Math" panose="02040503050406030204" pitchFamily="18" charset="0"/>
                             </a:rPr>
                           </m:ctrlPr>
@@ -5389,7 +5402,7 @@
                                   <a:solidFill>
                                     <a:prstClr val="black"/>
                                   </a:solidFill>
-                                  <a:latin typeface="Cambria Math"/>
+                                  <a:latin typeface="Cambria Math" panose="02040503050406030204" pitchFamily="18" charset="0"/>
                                   <a:ea typeface="Cambria Math" panose="02040503050406030204" pitchFamily="18" charset="0"/>
                                 </a:rPr>
                               </m:ctrlPr>
@@ -5402,7 +5415,7 @@
                                       <a:solidFill>
                                         <a:prstClr val="black"/>
                                       </a:solidFill>
-                                      <a:latin typeface="Cambria Math"/>
+                                      <a:latin typeface="Cambria Math" panose="02040503050406030204" pitchFamily="18" charset="0"/>
                                       <a:ea typeface="Cambria Math" panose="02040503050406030204" pitchFamily="18" charset="0"/>
                                     </a:rPr>
                                   </m:ctrlPr>
@@ -5442,7 +5455,7 @@
                                       <a:solidFill>
                                         <a:prstClr val="black"/>
                                       </a:solidFill>
-                                      <a:latin typeface="Cambria Math"/>
+                                      <a:latin typeface="Cambria Math" panose="02040503050406030204" pitchFamily="18" charset="0"/>
                                       <a:ea typeface="Cambria Math" panose="02040503050406030204" pitchFamily="18" charset="0"/>
                                     </a:rPr>
                                   </m:ctrlPr>
@@ -5469,7 +5482,7 @@
                                           <a:solidFill>
                                             <a:prstClr val="black"/>
                                           </a:solidFill>
-                                          <a:latin typeface="Cambria Math"/>
+                                          <a:latin typeface="Cambria Math" panose="02040503050406030204" pitchFamily="18" charset="0"/>
                                           <a:ea typeface="Cambria Math" panose="02040503050406030204" pitchFamily="18" charset="0"/>
                                         </a:rPr>
                                       </m:ctrlPr>
@@ -5482,7 +5495,7 @@
                                               <a:solidFill>
                                                 <a:prstClr val="black"/>
                                               </a:solidFill>
-                                              <a:latin typeface="Cambria Math"/>
+                                              <a:latin typeface="Cambria Math" panose="02040503050406030204" pitchFamily="18" charset="0"/>
                                               <a:ea typeface="Cambria Math" panose="02040503050406030204" pitchFamily="18" charset="0"/>
                                             </a:rPr>
                                           </m:ctrlPr>
@@ -5529,7 +5542,7 @@
                                               <a:solidFill>
                                                 <a:prstClr val="black"/>
                                               </a:solidFill>
-                                              <a:latin typeface="Cambria Math"/>
+                                              <a:latin typeface="Cambria Math" panose="02040503050406030204" pitchFamily="18" charset="0"/>
                                               <a:ea typeface="Cambria Math" panose="02040503050406030204" pitchFamily="18" charset="0"/>
                                             </a:rPr>
                                           </m:ctrlPr>
@@ -5576,7 +5589,7 @@
                                   <a:solidFill>
                                     <a:prstClr val="black"/>
                                   </a:solidFill>
-                                  <a:latin typeface="Cambria Math"/>
+                                  <a:latin typeface="Cambria Math" panose="02040503050406030204" pitchFamily="18" charset="0"/>
                                   <a:ea typeface="Cambria Math" panose="02040503050406030204" pitchFamily="18" charset="0"/>
                                 </a:rPr>
                               </m:ctrlPr>
@@ -5607,7 +5620,7 @@
                                       <a:solidFill>
                                         <a:prstClr val="black"/>
                                       </a:solidFill>
-                                      <a:latin typeface="Cambria Math"/>
+                                      <a:latin typeface="Cambria Math" panose="02040503050406030204" pitchFamily="18" charset="0"/>
                                       <a:ea typeface="Cambria Math" panose="02040503050406030204" pitchFamily="18" charset="0"/>
                                     </a:rPr>
                                   </m:ctrlPr>
@@ -5620,7 +5633,7 @@
                                           <a:solidFill>
                                             <a:prstClr val="black"/>
                                           </a:solidFill>
-                                          <a:latin typeface="Cambria Math"/>
+                                          <a:latin typeface="Cambria Math" panose="02040503050406030204" pitchFamily="18" charset="0"/>
                                           <a:ea typeface="Cambria Math" panose="02040503050406030204" pitchFamily="18" charset="0"/>
                                         </a:rPr>
                                       </m:ctrlPr>
@@ -5660,7 +5673,7 @@
                                           <a:solidFill>
                                             <a:prstClr val="black"/>
                                           </a:solidFill>
-                                          <a:latin typeface="Cambria Math"/>
+                                          <a:latin typeface="Cambria Math" panose="02040503050406030204" pitchFamily="18" charset="0"/>
                                           <a:ea typeface="Cambria Math" panose="02040503050406030204" pitchFamily="18" charset="0"/>
                                         </a:rPr>
                                       </m:ctrlPr>
@@ -5687,7 +5700,7 @@
                                               <a:solidFill>
                                                 <a:prstClr val="black"/>
                                               </a:solidFill>
-                                              <a:latin typeface="Cambria Math"/>
+                                              <a:latin typeface="Cambria Math" panose="02040503050406030204" pitchFamily="18" charset="0"/>
                                               <a:ea typeface="Cambria Math" panose="02040503050406030204" pitchFamily="18" charset="0"/>
                                             </a:rPr>
                                           </m:ctrlPr>
@@ -5700,7 +5713,7 @@
                                                   <a:solidFill>
                                                     <a:prstClr val="black"/>
                                                   </a:solidFill>
-                                                  <a:latin typeface="Cambria Math"/>
+                                                  <a:latin typeface="Cambria Math" panose="02040503050406030204" pitchFamily="18" charset="0"/>
                                                   <a:ea typeface="Cambria Math" panose="02040503050406030204" pitchFamily="18" charset="0"/>
                                                 </a:rPr>
                                               </m:ctrlPr>
@@ -5747,7 +5760,7 @@
                                                   <a:solidFill>
                                                     <a:prstClr val="black"/>
                                                   </a:solidFill>
-                                                  <a:latin typeface="Cambria Math"/>
+                                                  <a:latin typeface="Cambria Math" panose="02040503050406030204" pitchFamily="18" charset="0"/>
                                                   <a:ea typeface="Cambria Math" panose="02040503050406030204" pitchFamily="18" charset="0"/>
                                                 </a:rPr>
                                               </m:ctrlPr>
@@ -5826,7 +5839,7 @@
                             <a:solidFill>
                               <a:prstClr val="black"/>
                             </a:solidFill>
-                            <a:latin typeface="Cambria Math"/>
+                            <a:latin typeface="Cambria Math" panose="02040503050406030204" pitchFamily="18" charset="0"/>
                           </a:rPr>
                         </m:ctrlPr>
                       </m:sSubPr>
@@ -5860,7 +5873,7 @@
                             <a:solidFill>
                               <a:prstClr val="black"/>
                             </a:solidFill>
-                            <a:latin typeface="Cambria Math"/>
+                            <a:latin typeface="Cambria Math" panose="02040503050406030204" pitchFamily="18" charset="0"/>
                           </a:rPr>
                         </m:ctrlPr>
                       </m:dPr>
@@ -5872,7 +5885,7 @@
                                 <a:solidFill>
                                   <a:prstClr val="black"/>
                                 </a:solidFill>
-                                <a:latin typeface="Cambria Math"/>
+                                <a:latin typeface="Cambria Math" panose="02040503050406030204" pitchFamily="18" charset="0"/>
                               </a:rPr>
                             </m:ctrlPr>
                           </m:sSubPr>
@@ -5900,13 +5913,13 @@
                           </m:sub>
                         </m:sSub>
                         <m:r>
-                          <a:rPr lang="en-CA" sz="2800" i="1">
+                          <a:rPr lang="en-US" sz="2800" b="0" i="1" smtClean="0">
                             <a:solidFill>
                               <a:prstClr val="black"/>
                             </a:solidFill>
                             <a:latin typeface="Cambria Math" panose="02040503050406030204" pitchFamily="18" charset="0"/>
                           </a:rPr>
-                          <m:t>,</m:t>
+                          <m:t>|</m:t>
                         </m:r>
                         <m:sSub>
                           <m:sSubPr>
@@ -5915,7 +5928,7 @@
                                 <a:solidFill>
                                   <a:prstClr val="black"/>
                                 </a:solidFill>
-                                <a:latin typeface="Cambria Math"/>
+                                <a:latin typeface="Cambria Math" panose="02040503050406030204" pitchFamily="18" charset="0"/>
                               </a:rPr>
                             </m:ctrlPr>
                           </m:sSubPr>
@@ -5974,7 +5987,7 @@
                             <a:solidFill>
                               <a:prstClr val="black"/>
                             </a:solidFill>
-                            <a:latin typeface="Cambria Math"/>
+                            <a:latin typeface="Cambria Math" panose="02040503050406030204" pitchFamily="18" charset="0"/>
                           </a:rPr>
                         </m:ctrlPr>
                       </m:naryPr>
@@ -6037,11 +6050,20 @@
                                 <a:solidFill>
                                   <a:prstClr val="black"/>
                                 </a:solidFill>
-                                <a:latin typeface="Cambria Math"/>
+                                <a:latin typeface="Cambria Math" panose="02040503050406030204" pitchFamily="18" charset="0"/>
                               </a:rPr>
                             </m:ctrlPr>
                           </m:sSupPr>
                           <m:e>
+                            <m:r>
+                              <a:rPr lang="en-US" sz="2800" b="0" i="1" dirty="0" smtClean="0">
+                                <a:solidFill>
+                                  <a:prstClr val="black"/>
+                                </a:solidFill>
+                                <a:latin typeface="Cambria Math" panose="02040503050406030204" pitchFamily="18" charset="0"/>
+                              </a:rPr>
+                              <m:t>(</m:t>
+                            </m:r>
                             <m:r>
                               <a:rPr lang="en-US" sz="2800" b="0" i="1" dirty="0" smtClean="0">
                                 <a:solidFill>
@@ -6078,7 +6100,7 @@
                                     <a:solidFill>
                                       <a:prstClr val="black"/>
                                     </a:solidFill>
-                                    <a:latin typeface="Cambria Math"/>
+                                    <a:latin typeface="Cambria Math" panose="02040503050406030204" pitchFamily="18" charset="0"/>
                                   </a:rPr>
                                 </m:ctrlPr>
                               </m:dPr>
@@ -6103,7 +6125,25 @@
                             </a:solidFill>
                             <a:latin typeface="Cambria Math"/>
                           </a:rPr>
-                          <m:t>−1+</m:t>
+                          <m:t>−1</m:t>
+                        </m:r>
+                        <m:r>
+                          <a:rPr lang="en-US" sz="2800" b="0" i="1" dirty="0" smtClean="0">
+                            <a:solidFill>
+                              <a:prstClr val="black"/>
+                            </a:solidFill>
+                            <a:latin typeface="Cambria Math" panose="02040503050406030204" pitchFamily="18" charset="0"/>
+                          </a:rPr>
+                          <m:t>)</m:t>
+                        </m:r>
+                        <m:r>
+                          <a:rPr lang="en-US" sz="2800" b="0" i="1" dirty="0" smtClean="0">
+                            <a:solidFill>
+                              <a:prstClr val="black"/>
+                            </a:solidFill>
+                            <a:latin typeface="Cambria Math"/>
+                          </a:rPr>
+                          <m:t>+</m:t>
                         </m:r>
                         <m:r>
                           <a:rPr lang="en-US" sz="2800" b="0" i="1" dirty="0" smtClean="0">
@@ -6121,7 +6161,7 @@
                                 <a:solidFill>
                                   <a:prstClr val="black"/>
                                 </a:solidFill>
-                                <a:latin typeface="Cambria Math"/>
+                                <a:latin typeface="Cambria Math" panose="02040503050406030204" pitchFamily="18" charset="0"/>
                               </a:rPr>
                             </m:ctrlPr>
                           </m:sSupPr>
@@ -6133,7 +6173,7 @@
                                     <a:solidFill>
                                       <a:prstClr val="black"/>
                                     </a:solidFill>
-                                    <a:latin typeface="Cambria Math"/>
+                                    <a:latin typeface="Cambria Math" panose="02040503050406030204" pitchFamily="18" charset="0"/>
                                   </a:rPr>
                                 </m:ctrlPr>
                               </m:dPr>
@@ -6316,7 +6356,7 @@
                     </m:oMath>
                   </m:oMathPara>
                 </a14:m>
-                <a:endParaRPr lang="en-CA" sz="2800" dirty="0">
+                <a:endParaRPr lang="en-CA" sz="2800" dirty="0" smtClean="0">
                   <a:solidFill>
                     <a:prstClr val="black"/>
                   </a:solidFill>
@@ -6362,7 +6402,7 @@
                               <a:solidFill>
                                 <a:prstClr val="black"/>
                               </a:solidFill>
-                              <a:latin typeface="Cambria Math"/>
+                              <a:latin typeface="Cambria Math" panose="02040503050406030204" pitchFamily="18" charset="0"/>
                             </a:rPr>
                           </m:ctrlPr>
                         </m:dPr>
@@ -6374,7 +6414,7 @@
                                   <a:solidFill>
                                     <a:prstClr val="black"/>
                                   </a:solidFill>
-                                  <a:latin typeface="Cambria Math"/>
+                                  <a:latin typeface="Cambria Math" panose="02040503050406030204" pitchFamily="18" charset="0"/>
                                 </a:rPr>
                               </m:ctrlPr>
                             </m:sSubPr>
@@ -6417,7 +6457,7 @@
                                   <a:solidFill>
                                     <a:prstClr val="black"/>
                                   </a:solidFill>
-                                  <a:latin typeface="Cambria Math"/>
+                                  <a:latin typeface="Cambria Math" panose="02040503050406030204" pitchFamily="18" charset="0"/>
                                 </a:rPr>
                               </m:ctrlPr>
                             </m:sSubPr>
@@ -6480,7 +6520,7 @@
                               <a:solidFill>
                                 <a:prstClr val="black"/>
                               </a:solidFill>
-                              <a:latin typeface="Cambria Math"/>
+                              <a:latin typeface="Cambria Math" panose="02040503050406030204" pitchFamily="18" charset="0"/>
                             </a:rPr>
                           </m:ctrlPr>
                         </m:sSubPr>
@@ -6504,6 +6544,15 @@
                               <a:latin typeface="Cambria Math" panose="02040503050406030204" pitchFamily="18" charset="0"/>
                             </a:rPr>
                             <m:t>𝑇</m:t>
+                          </m:r>
+                          <m:r>
+                            <a:rPr lang="en-US" sz="2800" b="0" i="1" smtClean="0">
+                              <a:solidFill>
+                                <a:prstClr val="black"/>
+                              </a:solidFill>
+                              <a:latin typeface="Cambria Math" panose="02040503050406030204" pitchFamily="18" charset="0"/>
+                            </a:rPr>
+                            <m:t>𝑤𝑖𝑡𝑡𝑒𝑟</m:t>
                           </m:r>
                         </m:sub>
                       </m:sSub>
@@ -6541,7 +6590,7 @@
                               <a:solidFill>
                                 <a:prstClr val="black"/>
                               </a:solidFill>
-                              <a:latin typeface="Cambria Math"/>
+                              <a:latin typeface="Cambria Math" panose="02040503050406030204" pitchFamily="18" charset="0"/>
                             </a:rPr>
                           </m:ctrlPr>
                         </m:sSubPr>
@@ -6565,6 +6614,15 @@
                               <a:latin typeface="Cambria Math" panose="02040503050406030204" pitchFamily="18" charset="0"/>
                             </a:rPr>
                             <m:t>𝑊</m:t>
+                          </m:r>
+                          <m:r>
+                            <a:rPr lang="en-US" sz="2800" b="0" i="1" smtClean="0">
+                              <a:solidFill>
+                                <a:prstClr val="black"/>
+                              </a:solidFill>
+                              <a:latin typeface="Cambria Math" panose="02040503050406030204" pitchFamily="18" charset="0"/>
+                            </a:rPr>
+                            <m:t>𝑖𝑘𝑖</m:t>
                           </m:r>
                         </m:sub>
                       </m:sSub>
@@ -6593,7 +6651,7 @@
               <a:prstGeom prst="rect">
                 <a:avLst/>
               </a:prstGeom>
-              <a:blipFill rotWithShape="1">
+              <a:blipFill>
                 <a:blip r:embed="rId8"/>
                 <a:stretch>
                   <a:fillRect/>
@@ -6605,7 +6663,7 @@
               <a:lstStyle/>
               <a:p>
                 <a:r>
-                  <a:rPr lang="en-US">
+                  <a:rPr lang="en-IN">
                     <a:noFill/>
                   </a:rPr>
                   <a:t> </a:t>
@@ -6785,6 +6843,13 @@
   <p:clrMapOvr>
     <a:masterClrMapping/>
   </p:clrMapOvr>
+  <p:timing>
+    <p:tnLst>
+      <p:par>
+        <p:cTn id="1" dur="indefinite" restart="never" nodeType="tmRoot"/>
+      </p:par>
+    </p:tnLst>
+  </p:timing>
 </p:sld>
 </file>
 
@@ -7043,7 +7108,7 @@
   <a:extraClrSchemeLst/>
   <a:extLst>
     <a:ext uri="{05A4C25C-085E-4340-85A3-A5531E510DB2}">
-      <thm15:themeFamily xmlns:thm15="http://schemas.microsoft.com/office/thememl/2012/main" xmlns="" name="Office Theme" id="{62F939B6-93AF-4DB8-9C6B-D6C7DFDC589F}" vid="{4A3C46E8-61CC-4603-A589-7422A47A8E4A}"/>
+      <thm15:themeFamily xmlns:thm15="http://schemas.microsoft.com/office/thememl/2012/main" name="Office Theme" id="{62F939B6-93AF-4DB8-9C6B-D6C7DFDC589F}" vid="{4A3C46E8-61CC-4603-A589-7422A47A8E4A}"/>
     </a:ext>
   </a:extLst>
 </a:theme>

</xml_diff>